<commit_message>
Update to Powerpoint Presenation
Made it simpler to viewer
</commit_message>
<xml_diff>
--- a/powerpoint/codeDeck2.pptx
+++ b/powerpoint/codeDeck2.pptx
@@ -10,15 +10,12 @@
     <p:sldId id="257" r:id="rId4"/>
     <p:sldId id="259" r:id="rId5"/>
     <p:sldId id="267" r:id="rId6"/>
-    <p:sldId id="268" r:id="rId7"/>
-    <p:sldId id="269" r:id="rId8"/>
-    <p:sldId id="260" r:id="rId9"/>
-    <p:sldId id="261" r:id="rId10"/>
-    <p:sldId id="262" r:id="rId11"/>
-    <p:sldId id="263" r:id="rId12"/>
-    <p:sldId id="258" r:id="rId13"/>
-    <p:sldId id="265" r:id="rId14"/>
-    <p:sldId id="264" r:id="rId15"/>
+    <p:sldId id="261" r:id="rId7"/>
+    <p:sldId id="262" r:id="rId8"/>
+    <p:sldId id="263" r:id="rId9"/>
+    <p:sldId id="258" r:id="rId10"/>
+    <p:sldId id="265" r:id="rId11"/>
+    <p:sldId id="264" r:id="rId12"/>
   </p:sldIdLst>
   <p:sldSz cx="12192000" cy="6858000"/>
   <p:notesSz cx="6858000" cy="9144000"/>
@@ -119,7 +116,18 @@
   </p:defaultTextStyle>
   <p:extLst>
     <p:ext uri="{EFAFB233-063F-42B5-8137-9DF3F51BA10A}">
-      <p15:sldGuideLst xmlns="" xmlns:p15="http://schemas.microsoft.com/office/powerpoint/2012/main"/>
+      <p15:sldGuideLst xmlns:p15="http://schemas.microsoft.com/office/powerpoint/2012/main">
+        <p15:guide id="1" orient="horz" pos="2160">
+          <p15:clr>
+            <a:srgbClr val="A4A3A4"/>
+          </p15:clr>
+        </p15:guide>
+        <p15:guide id="2" pos="3840">
+          <p15:clr>
+            <a:srgbClr val="A4A3A4"/>
+          </p15:clr>
+        </p15:guide>
+      </p15:sldGuideLst>
     </p:ext>
   </p:extLst>
 </p:presentation>
@@ -295,7 +303,7 @@
             <a:fld id="{87DE6118-2437-4B30-8E3C-4D2BE6020583}" type="datetimeFigureOut">
               <a:rPr lang="en-US" dirty="0"/>
               <a:pPr/>
-              <a:t>9/6/2017</a:t>
+              <a:t>9/6/17</a:t>
             </a:fld>
             <a:endParaRPr lang="en-US" dirty="0"/>
           </a:p>
@@ -622,7 +630,7 @@
             <a:fld id="{87DE6118-2437-4B30-8E3C-4D2BE6020583}" type="datetimeFigureOut">
               <a:rPr lang="en-US" dirty="0"/>
               <a:pPr/>
-              <a:t>9/6/2017</a:t>
+              <a:t>9/6/17</a:t>
             </a:fld>
             <a:endParaRPr lang="en-US" dirty="0"/>
           </a:p>
@@ -799,7 +807,7 @@
             <a:fld id="{87DE6118-2437-4B30-8E3C-4D2BE6020583}" type="datetimeFigureOut">
               <a:rPr lang="en-US" dirty="0"/>
               <a:pPr/>
-              <a:t>9/6/2017</a:t>
+              <a:t>9/6/17</a:t>
             </a:fld>
             <a:endParaRPr lang="en-US" dirty="0"/>
           </a:p>
@@ -966,7 +974,7 @@
             <a:fld id="{87DE6118-2437-4B30-8E3C-4D2BE6020583}" type="datetimeFigureOut">
               <a:rPr lang="en-US" dirty="0"/>
               <a:pPr/>
-              <a:t>9/6/2017</a:t>
+              <a:t>9/6/17</a:t>
             </a:fld>
             <a:endParaRPr lang="en-US" dirty="0"/>
           </a:p>
@@ -1240,7 +1248,7 @@
             <a:fld id="{87DE6118-2437-4B30-8E3C-4D2BE6020583}" type="datetimeFigureOut">
               <a:rPr lang="en-US" dirty="0"/>
               <a:pPr/>
-              <a:t>9/6/2017</a:t>
+              <a:t>9/6/17</a:t>
             </a:fld>
             <a:endParaRPr lang="en-US" dirty="0"/>
           </a:p>
@@ -1631,7 +1639,7 @@
             <a:fld id="{87DE6118-2437-4B30-8E3C-4D2BE6020583}" type="datetimeFigureOut">
               <a:rPr lang="en-US" dirty="0"/>
               <a:pPr/>
-              <a:t>9/6/2017</a:t>
+              <a:t>9/6/17</a:t>
             </a:fld>
             <a:endParaRPr lang="en-US" dirty="0"/>
           </a:p>
@@ -2105,7 +2113,7 @@
             <a:fld id="{87DE6118-2437-4B30-8E3C-4D2BE6020583}" type="datetimeFigureOut">
               <a:rPr lang="en-US" dirty="0"/>
               <a:pPr/>
-              <a:t>9/6/2017</a:t>
+              <a:t>9/6/17</a:t>
             </a:fld>
             <a:endParaRPr lang="en-US" dirty="0"/>
           </a:p>
@@ -2220,7 +2228,7 @@
             <a:fld id="{87DE6118-2437-4B30-8E3C-4D2BE6020583}" type="datetimeFigureOut">
               <a:rPr lang="en-US" dirty="0"/>
               <a:pPr/>
-              <a:t>9/6/2017</a:t>
+              <a:t>9/6/17</a:t>
             </a:fld>
             <a:endParaRPr lang="en-US" dirty="0"/>
           </a:p>
@@ -2312,7 +2320,7 @@
             <a:fld id="{87DE6118-2437-4B30-8E3C-4D2BE6020583}" type="datetimeFigureOut">
               <a:rPr lang="en-US" dirty="0"/>
               <a:pPr/>
-              <a:t>9/6/2017</a:t>
+              <a:t>9/6/17</a:t>
             </a:fld>
             <a:endParaRPr lang="en-US" dirty="0"/>
           </a:p>
@@ -2655,7 +2663,7 @@
             <a:fld id="{87DE6118-2437-4B30-8E3C-4D2BE6020583}" type="datetimeFigureOut">
               <a:rPr lang="en-US" dirty="0"/>
               <a:pPr/>
-              <a:t>9/6/2017</a:t>
+              <a:t>9/6/17</a:t>
             </a:fld>
             <a:endParaRPr lang="en-US" dirty="0"/>
           </a:p>
@@ -3040,7 +3048,7 @@
             <a:fld id="{87DE6118-2437-4B30-8E3C-4D2BE6020583}" type="datetimeFigureOut">
               <a:rPr lang="en-US" dirty="0"/>
               <a:pPr/>
-              <a:t>9/6/2017</a:t>
+              <a:t>9/6/17</a:t>
             </a:fld>
             <a:endParaRPr lang="en-US" dirty="0"/>
           </a:p>
@@ -3315,7 +3323,7 @@
             <a:fld id="{87DE6118-2437-4B30-8E3C-4D2BE6020583}" type="datetimeFigureOut">
               <a:rPr lang="en-US" dirty="0"/>
               <a:pPr/>
-              <a:t>9/6/2017</a:t>
+              <a:t>9/6/17</a:t>
             </a:fld>
             <a:endParaRPr lang="en-US" dirty="0"/>
           </a:p>
@@ -3759,7 +3767,7 @@
   </p:txStyles>
   <p:extLst mod="1">
     <p:ext uri="{27BBF7A9-308A-43DC-89C8-2F10F3537804}">
-      <p15:sldGuideLst xmlns="" xmlns:p15="http://schemas.microsoft.com/office/powerpoint/2012/main">
+      <p15:sldGuideLst xmlns:p15="http://schemas.microsoft.com/office/powerpoint/2012/main">
         <p15:guide id="3" orient="horz" pos="1368">
           <p15:clr>
             <a:srgbClr val="F26B43"/>
@@ -3876,7 +3884,7 @@
     </p:spTree>
     <p:extLst>
       <p:ext uri="{BB962C8B-B14F-4D97-AF65-F5344CB8AC3E}">
-        <p14:creationId xmlns="" xmlns:p14="http://schemas.microsoft.com/office/powerpoint/2010/main" val="1536980256"/>
+        <p14:creationId xmlns:p14="http://schemas.microsoft.com/office/powerpoint/2010/main" val="1536980256"/>
       </p:ext>
     </p:extLst>
   </p:cSld>
@@ -3927,7 +3935,7 @@
           <a:p>
             <a:r>
               <a:rPr lang="en-US" dirty="0" smtClean="0"/>
-              <a:t>Demo</a:t>
+              <a:t>Cost</a:t>
             </a:r>
             <a:endParaRPr lang="en-US" dirty="0"/>
           </a:p>
@@ -3945,39 +3953,125 @@
         </p:nvSpPr>
         <p:spPr/>
         <p:txBody>
-          <a:bodyPr/>
+          <a:bodyPr>
+            <a:normAutofit/>
+          </a:bodyPr>
           <a:lstStyle/>
           <a:p>
             <a:r>
               <a:rPr lang="en-US" dirty="0" smtClean="0">
-                <a:hlinkClick r:id="rId2"/>
+                <a:solidFill>
+                  <a:schemeClr val="tx1"/>
+                </a:solidFill>
               </a:rPr>
-              <a:t>codeDeck</a:t>
-            </a:r>
-            <a:endParaRPr lang="en-US" dirty="0" smtClean="0"/>
-          </a:p>
-          <a:p>
-            <a:endParaRPr lang="en-US" dirty="0"/>
+              <a:t>Labor: 120 hours + 12 hours </a:t>
+            </a:r>
+            <a:r>
+              <a:rPr lang="en-US" dirty="0" smtClean="0">
+                <a:solidFill>
+                  <a:schemeClr val="tx1"/>
+                </a:solidFill>
+              </a:rPr>
+              <a:t>maintenance</a:t>
+            </a:r>
+          </a:p>
+          <a:p>
+            <a:endParaRPr lang="en-US" dirty="0" smtClean="0">
+              <a:solidFill>
+                <a:schemeClr val="tx1"/>
+              </a:solidFill>
+            </a:endParaRPr>
+          </a:p>
+          <a:p>
+            <a:r>
+              <a:rPr lang="en-US" dirty="0">
+                <a:solidFill>
+                  <a:schemeClr val="tx1"/>
+                </a:solidFill>
+              </a:rPr>
+              <a:t>Domain (Google): $12/year </a:t>
+            </a:r>
+            <a:endParaRPr lang="en-US" dirty="0" smtClean="0">
+              <a:solidFill>
+                <a:schemeClr val="tx1"/>
+              </a:solidFill>
+            </a:endParaRPr>
+          </a:p>
+          <a:p>
+            <a:endParaRPr lang="en-US" dirty="0" smtClean="0">
+              <a:solidFill>
+                <a:schemeClr val="tx1"/>
+              </a:solidFill>
+            </a:endParaRPr>
+          </a:p>
+          <a:p>
+            <a:r>
+              <a:rPr lang="en-US" dirty="0" smtClean="0">
+                <a:solidFill>
+                  <a:schemeClr val="tx1"/>
+                </a:solidFill>
+              </a:rPr>
+              <a:t>Cost of prototype/single deck: $</a:t>
+            </a:r>
+            <a:r>
+              <a:rPr lang="en-US" dirty="0" smtClean="0">
+                <a:solidFill>
+                  <a:schemeClr val="tx1"/>
+                </a:solidFill>
+              </a:rPr>
+              <a:t>0</a:t>
+            </a:r>
+          </a:p>
+          <a:p>
+            <a:endParaRPr lang="en-US" dirty="0" smtClean="0">
+              <a:solidFill>
+                <a:schemeClr val="tx1"/>
+              </a:solidFill>
+            </a:endParaRPr>
+          </a:p>
+          <a:p>
+            <a:r>
+              <a:rPr lang="en-US" dirty="0" smtClean="0">
+                <a:solidFill>
+                  <a:schemeClr val="tx1"/>
+                </a:solidFill>
+              </a:rPr>
+              <a:t>Free </a:t>
+            </a:r>
+            <a:r>
+              <a:rPr lang="en-US" dirty="0" smtClean="0">
+                <a:solidFill>
+                  <a:schemeClr val="tx1"/>
+                </a:solidFill>
+              </a:rPr>
+              <a:t>Firebase: 8k visitors and 2.5 million card downloads each </a:t>
+            </a:r>
+            <a:r>
+              <a:rPr lang="en-US" dirty="0" smtClean="0">
+                <a:solidFill>
+                  <a:schemeClr val="tx1"/>
+                </a:solidFill>
+              </a:rPr>
+              <a:t>month</a:t>
+            </a:r>
+            <a:endParaRPr lang="en-US" dirty="0" smtClean="0">
+              <a:solidFill>
+                <a:schemeClr val="tx1"/>
+              </a:solidFill>
+            </a:endParaRPr>
           </a:p>
         </p:txBody>
       </p:sp>
     </p:spTree>
     <p:extLst>
       <p:ext uri="{BB962C8B-B14F-4D97-AF65-F5344CB8AC3E}">
-        <p14:creationId xmlns="" xmlns:p14="http://schemas.microsoft.com/office/powerpoint/2010/main" val="1463705858"/>
+        <p14:creationId xmlns:p14="http://schemas.microsoft.com/office/powerpoint/2010/main" val="1992923292"/>
       </p:ext>
     </p:extLst>
   </p:cSld>
   <p:clrMapOvr>
     <a:masterClrMapping/>
   </p:clrMapOvr>
-  <p:timing>
-    <p:tnLst>
-      <p:par>
-        <p:cTn id="1" dur="indefinite" restart="never" nodeType="tmRoot"/>
-      </p:par>
-    </p:tnLst>
-  </p:timing>
 </p:sld>
 </file>
 
@@ -4014,20 +4108,16 @@
           <a:lstStyle/>
           <a:p>
             <a:r>
-              <a:rPr lang="en-US" dirty="0"/>
-              <a:t>Directions for </a:t>
-            </a:r>
-            <a:r>
-              <a:rPr lang="en-US" dirty="0" smtClean="0"/>
-              <a:t>Future Development</a:t>
-            </a:r>
-            <a:endParaRPr lang="en-US" dirty="0"/>
-          </a:p>
-        </p:txBody>
-      </p:sp>
-      <p:sp>
-        <p:nvSpPr>
-          <p:cNvPr id="5" name="Content Placeholder 4"/>
+              <a:rPr lang="en-US" dirty="0" smtClean="0"/>
+              <a:t>Group Milestones</a:t>
+            </a:r>
+            <a:endParaRPr lang="en-US" dirty="0"/>
+          </a:p>
+        </p:txBody>
+      </p:sp>
+      <p:sp>
+        <p:nvSpPr>
+          <p:cNvPr id="3" name="Content Placeholder 2"/>
           <p:cNvSpPr>
             <a:spLocks noGrp="1"/>
           </p:cNvSpPr>
@@ -4037,16 +4127,12 @@
         </p:nvSpPr>
         <p:spPr/>
         <p:txBody>
-          <a:bodyPr numCol="2"/>
+          <a:bodyPr/>
           <a:lstStyle/>
           <a:p>
             <a:r>
               <a:rPr lang="en-US" dirty="0" smtClean="0"/>
-              <a:t>Additional </a:t>
-            </a:r>
-            <a:r>
-              <a:rPr lang="en-US" dirty="0" smtClean="0"/>
-              <a:t>Decks</a:t>
+              <a:t>Finding API’s</a:t>
             </a:r>
           </a:p>
           <a:p>
@@ -4055,7 +4141,7 @@
           <a:p>
             <a:r>
               <a:rPr lang="en-US" dirty="0" smtClean="0"/>
-              <a:t>Quiz</a:t>
+              <a:t>Minimum features</a:t>
             </a:r>
           </a:p>
           <a:p>
@@ -4064,43 +4150,28 @@
           <a:p>
             <a:r>
               <a:rPr lang="en-US" dirty="0" smtClean="0"/>
-              <a:t>Printable </a:t>
-            </a:r>
-            <a:r>
-              <a:rPr lang="en-US" dirty="0" smtClean="0"/>
-              <a:t>Decks</a:t>
+              <a:t>Define scope </a:t>
+            </a:r>
+            <a:r>
+              <a:rPr lang="en-US" dirty="0" smtClean="0"/>
+              <a:t>of </a:t>
+            </a:r>
+            <a:r>
+              <a:rPr lang="en-US" dirty="0" smtClean="0"/>
+              <a:t>work</a:t>
             </a:r>
           </a:p>
           <a:p>
             <a:endParaRPr lang="en-US" dirty="0" smtClean="0"/>
           </a:p>
           <a:p>
-            <a:endParaRPr lang="en-US" dirty="0" smtClean="0"/>
-          </a:p>
-          <a:p>
-            <a:endParaRPr lang="en-US" dirty="0" smtClean="0"/>
-          </a:p>
-          <a:p>
-            <a:r>
-              <a:rPr lang="en-US" dirty="0" smtClean="0"/>
-              <a:t>View deck in </a:t>
-            </a:r>
-            <a:r>
-              <a:rPr lang="en-US" dirty="0" smtClean="0"/>
-              <a:t>reverse</a:t>
-            </a:r>
-          </a:p>
-          <a:p>
-            <a:endParaRPr lang="en-US" dirty="0" smtClean="0"/>
-          </a:p>
-          <a:p>
-            <a:r>
-              <a:rPr lang="en-US" dirty="0" smtClean="0"/>
-              <a:t>Dismiss </a:t>
-            </a:r>
-            <a:r>
-              <a:rPr lang="en-US" dirty="0" smtClean="0"/>
-              <a:t>cards</a:t>
+            <a:r>
+              <a:rPr lang="en-US" dirty="0" smtClean="0"/>
+              <a:t>Using version </a:t>
+            </a:r>
+            <a:r>
+              <a:rPr lang="en-US" dirty="0" smtClean="0"/>
+              <a:t>control as a group</a:t>
             </a:r>
           </a:p>
         </p:txBody>
@@ -4108,441 +4179,7 @@
     </p:spTree>
     <p:extLst>
       <p:ext uri="{BB962C8B-B14F-4D97-AF65-F5344CB8AC3E}">
-        <p14:creationId xmlns="" xmlns:p14="http://schemas.microsoft.com/office/powerpoint/2010/main" val="1079179021"/>
-      </p:ext>
-    </p:extLst>
-  </p:cSld>
-  <p:clrMapOvr>
-    <a:masterClrMapping/>
-  </p:clrMapOvr>
-  <p:timing>
-    <p:tnLst>
-      <p:par>
-        <p:cTn id="1" dur="indefinite" restart="never" nodeType="tmRoot"/>
-      </p:par>
-    </p:tnLst>
-  </p:timing>
-</p:sld>
-</file>
-
-<file path=ppt/slides/slide12.xml><?xml version="1.0" encoding="utf-8"?>
-<p:sld xmlns:a="http://schemas.openxmlformats.org/drawingml/2006/main" xmlns:r="http://schemas.openxmlformats.org/officeDocument/2006/relationships" xmlns:p="http://schemas.openxmlformats.org/presentationml/2006/main">
-  <p:cSld>
-    <p:spTree>
-      <p:nvGrpSpPr>
-        <p:cNvPr id="1" name=""/>
-        <p:cNvGrpSpPr/>
-        <p:nvPr/>
-      </p:nvGrpSpPr>
-      <p:grpSpPr>
-        <a:xfrm>
-          <a:off x="0" y="0"/>
-          <a:ext cx="0" cy="0"/>
-          <a:chOff x="0" y="0"/>
-          <a:chExt cx="0" cy="0"/>
-        </a:xfrm>
-      </p:grpSpPr>
-      <p:sp>
-        <p:nvSpPr>
-          <p:cNvPr id="2" name="Title 1"/>
-          <p:cNvSpPr>
-            <a:spLocks noGrp="1"/>
-          </p:cNvSpPr>
-          <p:nvPr>
-            <p:ph type="title"/>
-          </p:nvPr>
-        </p:nvSpPr>
-        <p:spPr/>
-        <p:txBody>
-          <a:bodyPr/>
-          <a:lstStyle/>
-          <a:p>
-            <a:r>
-              <a:rPr lang="en-US" dirty="0" smtClean="0"/>
-              <a:t>Marketing Plan</a:t>
-            </a:r>
-            <a:endParaRPr lang="en-US" dirty="0"/>
-          </a:p>
-        </p:txBody>
-      </p:sp>
-      <p:sp>
-        <p:nvSpPr>
-          <p:cNvPr id="3" name="Content Placeholder 2"/>
-          <p:cNvSpPr>
-            <a:spLocks noGrp="1"/>
-          </p:cNvSpPr>
-          <p:nvPr>
-            <p:ph idx="1"/>
-          </p:nvPr>
-        </p:nvSpPr>
-        <p:spPr/>
-        <p:txBody>
-          <a:bodyPr>
-            <a:normAutofit/>
-          </a:bodyPr>
-          <a:lstStyle/>
-          <a:p>
-            <a:r>
-              <a:rPr lang="en-US" dirty="0" smtClean="0"/>
-              <a:t>Word-of-Mouth Marketing</a:t>
-            </a:r>
-          </a:p>
-          <a:p>
-            <a:r>
-              <a:rPr lang="en-US" dirty="0" smtClean="0"/>
-              <a:t>Social Media</a:t>
-            </a:r>
-          </a:p>
-          <a:p>
-            <a:r>
-              <a:rPr lang="en-US" dirty="0" smtClean="0"/>
-              <a:t>SEO</a:t>
-            </a:r>
-          </a:p>
-          <a:p>
-            <a:r>
-              <a:rPr lang="en-US" dirty="0" smtClean="0"/>
-              <a:t>Seek partnerships with educational </a:t>
-            </a:r>
-            <a:r>
-              <a:rPr lang="en-US" dirty="0" smtClean="0"/>
-              <a:t>organizations</a:t>
-            </a:r>
-            <a:endParaRPr lang="en-US" dirty="0" smtClean="0"/>
-          </a:p>
-          <a:p>
-            <a:r>
-              <a:rPr lang="en-US" dirty="0" smtClean="0"/>
-              <a:t>Utilizing </a:t>
-            </a:r>
-            <a:r>
-              <a:rPr lang="en-US" dirty="0"/>
-              <a:t>A</a:t>
-            </a:r>
-            <a:r>
-              <a:rPr lang="en-US" dirty="0" smtClean="0"/>
-              <a:t>dSense from Google to help drive revenue.</a:t>
-            </a:r>
-            <a:endParaRPr lang="en-US" dirty="0"/>
-          </a:p>
-          <a:p>
-            <a:r>
-              <a:rPr lang="en-US" dirty="0" smtClean="0">
-                <a:solidFill>
-                  <a:schemeClr val="tx1"/>
-                </a:solidFill>
-              </a:rPr>
-              <a:t>On-line or download via </a:t>
-            </a:r>
-            <a:r>
-              <a:rPr lang="en-US" dirty="0" err="1" smtClean="0">
-                <a:solidFill>
-                  <a:schemeClr val="tx1"/>
-                </a:solidFill>
-              </a:rPr>
-              <a:t>Git</a:t>
-            </a:r>
-            <a:r>
-              <a:rPr lang="en-US" dirty="0" smtClean="0">
-                <a:solidFill>
-                  <a:schemeClr val="tx1"/>
-                </a:solidFill>
-              </a:rPr>
-              <a:t> Hub</a:t>
-            </a:r>
-            <a:endParaRPr lang="en-US" dirty="0">
-              <a:solidFill>
-                <a:schemeClr val="tx1"/>
-              </a:solidFill>
-            </a:endParaRPr>
-          </a:p>
-        </p:txBody>
-      </p:sp>
-    </p:spTree>
-    <p:extLst>
-      <p:ext uri="{BB962C8B-B14F-4D97-AF65-F5344CB8AC3E}">
-        <p14:creationId xmlns="" xmlns:p14="http://schemas.microsoft.com/office/powerpoint/2010/main" val="1040487182"/>
-      </p:ext>
-    </p:extLst>
-  </p:cSld>
-  <p:clrMapOvr>
-    <a:masterClrMapping/>
-  </p:clrMapOvr>
-  <p:timing>
-    <p:tnLst>
-      <p:par>
-        <p:cTn id="1" dur="indefinite" restart="never" nodeType="tmRoot"/>
-      </p:par>
-    </p:tnLst>
-  </p:timing>
-</p:sld>
-</file>
-
-<file path=ppt/slides/slide13.xml><?xml version="1.0" encoding="utf-8"?>
-<p:sld xmlns:a="http://schemas.openxmlformats.org/drawingml/2006/main" xmlns:r="http://schemas.openxmlformats.org/officeDocument/2006/relationships" xmlns:p="http://schemas.openxmlformats.org/presentationml/2006/main">
-  <p:cSld>
-    <p:spTree>
-      <p:nvGrpSpPr>
-        <p:cNvPr id="1" name=""/>
-        <p:cNvGrpSpPr/>
-        <p:nvPr/>
-      </p:nvGrpSpPr>
-      <p:grpSpPr>
-        <a:xfrm>
-          <a:off x="0" y="0"/>
-          <a:ext cx="0" cy="0"/>
-          <a:chOff x="0" y="0"/>
-          <a:chExt cx="0" cy="0"/>
-        </a:xfrm>
-      </p:grpSpPr>
-      <p:sp>
-        <p:nvSpPr>
-          <p:cNvPr id="2" name="Title 1"/>
-          <p:cNvSpPr>
-            <a:spLocks noGrp="1"/>
-          </p:cNvSpPr>
-          <p:nvPr>
-            <p:ph type="title"/>
-          </p:nvPr>
-        </p:nvSpPr>
-        <p:spPr/>
-        <p:txBody>
-          <a:bodyPr/>
-          <a:lstStyle/>
-          <a:p>
-            <a:r>
-              <a:rPr lang="en-US" dirty="0" smtClean="0"/>
-              <a:t>Cost</a:t>
-            </a:r>
-            <a:endParaRPr lang="en-US" dirty="0"/>
-          </a:p>
-        </p:txBody>
-      </p:sp>
-      <p:sp>
-        <p:nvSpPr>
-          <p:cNvPr id="3" name="Content Placeholder 2"/>
-          <p:cNvSpPr>
-            <a:spLocks noGrp="1"/>
-          </p:cNvSpPr>
-          <p:nvPr>
-            <p:ph idx="1"/>
-          </p:nvPr>
-        </p:nvSpPr>
-        <p:spPr/>
-        <p:txBody>
-          <a:bodyPr>
-            <a:normAutofit/>
-          </a:bodyPr>
-          <a:lstStyle/>
-          <a:p>
-            <a:r>
-              <a:rPr lang="en-US" dirty="0" smtClean="0">
-                <a:solidFill>
-                  <a:schemeClr val="tx1"/>
-                </a:solidFill>
-              </a:rPr>
-              <a:t>Labor: 120 hours + 12 hours maintenance</a:t>
-            </a:r>
-            <a:endParaRPr lang="en-US" dirty="0" smtClean="0">
-              <a:solidFill>
-                <a:schemeClr val="tx1"/>
-              </a:solidFill>
-            </a:endParaRPr>
-          </a:p>
-          <a:p>
-            <a:r>
-              <a:rPr lang="en-US" dirty="0" smtClean="0">
-                <a:solidFill>
-                  <a:schemeClr val="tx1"/>
-                </a:solidFill>
-              </a:rPr>
-              <a:t>Cost of prototype/single deck: $0</a:t>
-            </a:r>
-            <a:endParaRPr lang="en-US" dirty="0" smtClean="0">
-              <a:solidFill>
-                <a:schemeClr val="tx1"/>
-              </a:solidFill>
-            </a:endParaRPr>
-          </a:p>
-          <a:p>
-            <a:r>
-              <a:rPr lang="en-US" dirty="0" smtClean="0">
-                <a:solidFill>
-                  <a:schemeClr val="tx1"/>
-                </a:solidFill>
-              </a:rPr>
-              <a:t>Domain (Google): $12/year </a:t>
-            </a:r>
-            <a:endParaRPr lang="en-US" dirty="0" smtClean="0">
-              <a:solidFill>
-                <a:schemeClr val="tx1"/>
-              </a:solidFill>
-            </a:endParaRPr>
-          </a:p>
-          <a:p>
-            <a:r>
-              <a:rPr lang="en-US" dirty="0" smtClean="0">
-                <a:solidFill>
-                  <a:schemeClr val="tx1"/>
-                </a:solidFill>
-              </a:rPr>
-              <a:t>Free Firebase: </a:t>
-            </a:r>
-            <a:r>
-              <a:rPr lang="en-US" dirty="0" err="1" smtClean="0">
-                <a:solidFill>
-                  <a:schemeClr val="tx1"/>
-                </a:solidFill>
-              </a:rPr>
-              <a:t>8k</a:t>
-            </a:r>
-            <a:r>
-              <a:rPr lang="en-US" dirty="0" smtClean="0">
-                <a:solidFill>
-                  <a:schemeClr val="tx1"/>
-                </a:solidFill>
-              </a:rPr>
-              <a:t> visitors and 2.5 million card downloads each month</a:t>
-            </a:r>
-            <a:endParaRPr lang="en-US" dirty="0" smtClean="0">
-              <a:solidFill>
-                <a:schemeClr val="tx1"/>
-              </a:solidFill>
-            </a:endParaRPr>
-          </a:p>
-          <a:p>
-            <a:r>
-              <a:rPr lang="en-US" dirty="0" smtClean="0">
-                <a:solidFill>
-                  <a:schemeClr val="tx1"/>
-                </a:solidFill>
-              </a:rPr>
-              <a:t>$25/month Firebase: </a:t>
-            </a:r>
-            <a:r>
-              <a:rPr lang="en-US" dirty="0" err="1" smtClean="0">
-                <a:solidFill>
-                  <a:schemeClr val="tx1"/>
-                </a:solidFill>
-              </a:rPr>
-              <a:t>16k</a:t>
-            </a:r>
-            <a:r>
-              <a:rPr lang="en-US" dirty="0" smtClean="0">
-                <a:solidFill>
-                  <a:schemeClr val="tx1"/>
-                </a:solidFill>
-              </a:rPr>
-              <a:t> visitors and 5 million card downloads each month</a:t>
-            </a:r>
-            <a:endParaRPr lang="en-US" dirty="0" smtClean="0">
-              <a:solidFill>
-                <a:schemeClr val="tx1"/>
-              </a:solidFill>
-            </a:endParaRPr>
-          </a:p>
-        </p:txBody>
-      </p:sp>
-    </p:spTree>
-    <p:extLst>
-      <p:ext uri="{BB962C8B-B14F-4D97-AF65-F5344CB8AC3E}">
-        <p14:creationId xmlns="" xmlns:p14="http://schemas.microsoft.com/office/powerpoint/2010/main" val="1992923292"/>
-      </p:ext>
-    </p:extLst>
-  </p:cSld>
-  <p:clrMapOvr>
-    <a:masterClrMapping/>
-  </p:clrMapOvr>
-</p:sld>
-</file>
-
-<file path=ppt/slides/slide14.xml><?xml version="1.0" encoding="utf-8"?>
-<p:sld xmlns:a="http://schemas.openxmlformats.org/drawingml/2006/main" xmlns:r="http://schemas.openxmlformats.org/officeDocument/2006/relationships" xmlns:p="http://schemas.openxmlformats.org/presentationml/2006/main">
-  <p:cSld>
-    <p:spTree>
-      <p:nvGrpSpPr>
-        <p:cNvPr id="1" name=""/>
-        <p:cNvGrpSpPr/>
-        <p:nvPr/>
-      </p:nvGrpSpPr>
-      <p:grpSpPr>
-        <a:xfrm>
-          <a:off x="0" y="0"/>
-          <a:ext cx="0" cy="0"/>
-          <a:chOff x="0" y="0"/>
-          <a:chExt cx="0" cy="0"/>
-        </a:xfrm>
-      </p:grpSpPr>
-      <p:sp>
-        <p:nvSpPr>
-          <p:cNvPr id="2" name="Title 1"/>
-          <p:cNvSpPr>
-            <a:spLocks noGrp="1"/>
-          </p:cNvSpPr>
-          <p:nvPr>
-            <p:ph type="title"/>
-          </p:nvPr>
-        </p:nvSpPr>
-        <p:spPr/>
-        <p:txBody>
-          <a:bodyPr/>
-          <a:lstStyle/>
-          <a:p>
-            <a:r>
-              <a:rPr lang="en-US" dirty="0" smtClean="0"/>
-              <a:t>Group Milestones</a:t>
-            </a:r>
-            <a:endParaRPr lang="en-US" dirty="0"/>
-          </a:p>
-        </p:txBody>
-      </p:sp>
-      <p:sp>
-        <p:nvSpPr>
-          <p:cNvPr id="3" name="Content Placeholder 2"/>
-          <p:cNvSpPr>
-            <a:spLocks noGrp="1"/>
-          </p:cNvSpPr>
-          <p:nvPr>
-            <p:ph idx="1"/>
-          </p:nvPr>
-        </p:nvSpPr>
-        <p:spPr/>
-        <p:txBody>
-          <a:bodyPr/>
-          <a:lstStyle/>
-          <a:p>
-            <a:r>
-              <a:rPr lang="en-US" dirty="0" smtClean="0"/>
-              <a:t>Finding suitable API’s</a:t>
-            </a:r>
-            <a:endParaRPr lang="en-US" dirty="0" smtClean="0"/>
-          </a:p>
-          <a:p>
-            <a:r>
-              <a:rPr lang="en-US" dirty="0" smtClean="0"/>
-              <a:t>Establishing minimum features for first version.</a:t>
-            </a:r>
-            <a:endParaRPr lang="en-US" dirty="0" smtClean="0"/>
-          </a:p>
-          <a:p>
-            <a:r>
-              <a:rPr lang="en-US" dirty="0" smtClean="0"/>
-              <a:t>Knowing your scope of work and being able to communicate to others.</a:t>
-            </a:r>
-          </a:p>
-          <a:p>
-            <a:r>
-              <a:rPr lang="en-US" dirty="0" smtClean="0"/>
-              <a:t>Using version control as a group</a:t>
-            </a:r>
-            <a:endParaRPr lang="en-US" dirty="0" smtClean="0"/>
-          </a:p>
-        </p:txBody>
-      </p:sp>
-    </p:spTree>
-    <p:extLst>
-      <p:ext uri="{BB962C8B-B14F-4D97-AF65-F5344CB8AC3E}">
-        <p14:creationId xmlns="" xmlns:p14="http://schemas.microsoft.com/office/powerpoint/2010/main" val="1915101970"/>
+        <p14:creationId xmlns:p14="http://schemas.microsoft.com/office/powerpoint/2010/main" val="1915101970"/>
       </p:ext>
     </p:extLst>
   </p:cSld>
@@ -4618,55 +4255,87 @@
           <a:p>
             <a:r>
               <a:rPr lang="en-US" dirty="0" smtClean="0"/>
-              <a:t>Application’s Concepts</a:t>
-            </a:r>
-          </a:p>
-          <a:p>
-            <a:r>
-              <a:rPr lang="en-US" dirty="0" smtClean="0"/>
-              <a:t>Motivation for its Development</a:t>
-            </a:r>
-          </a:p>
-          <a:p>
-            <a:r>
-              <a:rPr lang="en-US" dirty="0" smtClean="0"/>
-              <a:t>Design Process</a:t>
-            </a:r>
-          </a:p>
-          <a:p>
-            <a:r>
-              <a:rPr lang="en-US" dirty="0" smtClean="0"/>
-              <a:t>Technologies</a:t>
-            </a:r>
-          </a:p>
-          <a:p>
-            <a:r>
-              <a:rPr lang="en-US" dirty="0" smtClean="0"/>
-              <a:t>Demo</a:t>
-            </a:r>
-          </a:p>
-          <a:p>
-            <a:r>
-              <a:rPr lang="en-US" dirty="0" smtClean="0"/>
-              <a:t>Future Development</a:t>
-            </a:r>
-          </a:p>
-          <a:p>
-            <a:r>
-              <a:rPr lang="en-US" dirty="0" smtClean="0"/>
-              <a:t>Marketing Plan</a:t>
-            </a:r>
-          </a:p>
-          <a:p>
-            <a:r>
-              <a:rPr lang="en-US" dirty="0" smtClean="0"/>
-              <a:t>Cost</a:t>
-            </a:r>
-          </a:p>
-          <a:p>
-            <a:r>
-              <a:rPr lang="en-US" dirty="0" smtClean="0"/>
-              <a:t>Group Milestones</a:t>
+              <a:t>Application’s </a:t>
+            </a:r>
+            <a:r>
+              <a:rPr lang="en-US" dirty="0" smtClean="0"/>
+              <a:t>Concept </a:t>
+            </a:r>
+            <a:endParaRPr lang="en-US" dirty="0" smtClean="0"/>
+          </a:p>
+          <a:p>
+            <a:r>
+              <a:rPr lang="en-US" dirty="0" smtClean="0"/>
+              <a:t>Motivation for its </a:t>
+            </a:r>
+            <a:r>
+              <a:rPr lang="en-US" dirty="0" smtClean="0"/>
+              <a:t>Development </a:t>
+            </a:r>
+            <a:endParaRPr lang="en-US" dirty="0" smtClean="0"/>
+          </a:p>
+          <a:p>
+            <a:r>
+              <a:rPr lang="en-US" dirty="0" smtClean="0"/>
+              <a:t>Design </a:t>
+            </a:r>
+            <a:r>
+              <a:rPr lang="en-US" dirty="0" smtClean="0"/>
+              <a:t>Process </a:t>
+            </a:r>
+            <a:endParaRPr lang="en-US" dirty="0" smtClean="0"/>
+          </a:p>
+          <a:p>
+            <a:r>
+              <a:rPr lang="en-US" dirty="0" smtClean="0"/>
+              <a:t>Technologies </a:t>
+            </a:r>
+            <a:endParaRPr lang="en-US" dirty="0" smtClean="0"/>
+          </a:p>
+          <a:p>
+            <a:r>
+              <a:rPr lang="en-US" dirty="0" smtClean="0"/>
+              <a:t>Demo </a:t>
+            </a:r>
+            <a:endParaRPr lang="en-US" dirty="0" smtClean="0"/>
+          </a:p>
+          <a:p>
+            <a:r>
+              <a:rPr lang="en-US" dirty="0" smtClean="0"/>
+              <a:t>Future </a:t>
+            </a:r>
+            <a:r>
+              <a:rPr lang="en-US" dirty="0" smtClean="0"/>
+              <a:t>Development </a:t>
+            </a:r>
+            <a:endParaRPr lang="en-US" dirty="0" smtClean="0"/>
+          </a:p>
+          <a:p>
+            <a:r>
+              <a:rPr lang="en-US" dirty="0" smtClean="0"/>
+              <a:t>Marketing </a:t>
+            </a:r>
+            <a:r>
+              <a:rPr lang="en-US" dirty="0" smtClean="0"/>
+              <a:t>Plan </a:t>
+            </a:r>
+            <a:endParaRPr lang="en-US" dirty="0" smtClean="0"/>
+          </a:p>
+          <a:p>
+            <a:r>
+              <a:rPr lang="en-US" dirty="0" smtClean="0"/>
+              <a:t>Cost </a:t>
+            </a:r>
+            <a:endParaRPr lang="en-US" dirty="0" smtClean="0"/>
+          </a:p>
+          <a:p>
+            <a:r>
+              <a:rPr lang="en-US" dirty="0" smtClean="0"/>
+              <a:t>Group </a:t>
+            </a:r>
+            <a:r>
+              <a:rPr lang="en-US" dirty="0" smtClean="0"/>
+              <a:t>Milestones </a:t>
             </a:r>
             <a:endParaRPr lang="en-US" dirty="0"/>
           </a:p>
@@ -4675,7 +4344,7 @@
     </p:spTree>
     <p:extLst>
       <p:ext uri="{BB962C8B-B14F-4D97-AF65-F5344CB8AC3E}">
-        <p14:creationId xmlns="" xmlns:p14="http://schemas.microsoft.com/office/powerpoint/2010/main" val="2016633862"/>
+        <p14:creationId xmlns:p14="http://schemas.microsoft.com/office/powerpoint/2010/main" val="2016633862"/>
       </p:ext>
     </p:extLst>
   </p:cSld>
@@ -4719,7 +4388,11 @@
           <a:p>
             <a:r>
               <a:rPr lang="en-US" dirty="0" smtClean="0"/>
-              <a:t>Application’s Concepts</a:t>
+              <a:t>Application’s </a:t>
+            </a:r>
+            <a:r>
+              <a:rPr lang="en-US" dirty="0" smtClean="0"/>
+              <a:t>Concept</a:t>
             </a:r>
             <a:endParaRPr lang="en-US" dirty="0"/>
           </a:p>
@@ -4742,13 +4415,18 @@
           <a:p>
             <a:r>
               <a:rPr lang="en-US" dirty="0" smtClean="0"/>
-              <a:t>Flash Cards in your browser or on your smart phone.</a:t>
-            </a:r>
-          </a:p>
-          <a:p>
+              <a:t>Flash Cards in your browser or on your smart </a:t>
+            </a:r>
+            <a:r>
+              <a:rPr lang="en-US" dirty="0" smtClean="0"/>
+              <a:t>phone</a:t>
+            </a:r>
             <a:endParaRPr lang="en-US" dirty="0" smtClean="0"/>
           </a:p>
           <a:p>
+            <a:endParaRPr lang="en-US" dirty="0" smtClean="0"/>
+          </a:p>
+          <a:p>
             <a:r>
               <a:rPr lang="en-US" dirty="0" smtClean="0"/>
               <a:t>Simple learning aid</a:t>
@@ -4760,11 +4438,7 @@
           <a:p>
             <a:r>
               <a:rPr lang="en-US" dirty="0" smtClean="0"/>
-              <a:t>Spark curiosity and go deeper with Wikipe</a:t>
-            </a:r>
-            <a:r>
-              <a:rPr lang="en-US" dirty="0" smtClean="0"/>
-              <a:t>dia</a:t>
+              <a:t>Spark curiosity and go deeper with Wikipedia</a:t>
             </a:r>
           </a:p>
           <a:p>
@@ -4773,7 +4447,11 @@
           <a:p>
             <a:r>
               <a:rPr lang="en-US" dirty="0" smtClean="0"/>
-              <a:t>Make it fun. Celebrate milestones.</a:t>
+              <a:t>Make it </a:t>
+            </a:r>
+            <a:r>
+              <a:rPr lang="en-US" dirty="0" smtClean="0"/>
+              <a:t>fun and celebrate milestones</a:t>
             </a:r>
             <a:endParaRPr lang="en-US" dirty="0"/>
           </a:p>
@@ -4785,7 +4463,7 @@
     </p:spTree>
     <p:extLst>
       <p:ext uri="{BB962C8B-B14F-4D97-AF65-F5344CB8AC3E}">
-        <p14:creationId xmlns="" xmlns:p14="http://schemas.microsoft.com/office/powerpoint/2010/main" val="1594798827"/>
+        <p14:creationId xmlns:p14="http://schemas.microsoft.com/office/powerpoint/2010/main" val="1594798827"/>
       </p:ext>
     </p:extLst>
   </p:cSld>
@@ -4867,30 +4545,19 @@
           <a:p>
             <a:r>
               <a:rPr lang="en-US" dirty="0" smtClean="0"/>
-              <a:t>Create a simple and easy to use learning aid.</a:t>
-            </a:r>
+              <a:t>Self motivation</a:t>
+            </a:r>
+          </a:p>
+          <a:p>
             <a:endParaRPr lang="en-US" dirty="0" smtClean="0"/>
           </a:p>
           <a:p>
             <a:r>
               <a:rPr lang="en-US" dirty="0" smtClean="0"/>
-              <a:t>Challenge of learning to use </a:t>
-            </a:r>
-            <a:r>
-              <a:rPr lang="en-US" dirty="0" err="1" smtClean="0"/>
-              <a:t>Git</a:t>
-            </a:r>
-            <a:r>
-              <a:rPr lang="en-US" dirty="0" smtClean="0"/>
-              <a:t> on the command line.</a:t>
-            </a:r>
-            <a:endParaRPr lang="en-US" dirty="0" smtClean="0"/>
-          </a:p>
-          <a:p>
-            <a:r>
-              <a:rPr lang="en-US" dirty="0" smtClean="0"/>
-              <a:t>Eventual addition of other topics</a:t>
-            </a:r>
+              <a:t>Additional topics</a:t>
+            </a:r>
+          </a:p>
+          <a:p>
             <a:endParaRPr lang="en-US" dirty="0" smtClean="0"/>
           </a:p>
           <a:p>
@@ -4905,7 +4572,7 @@
     </p:spTree>
     <p:extLst>
       <p:ext uri="{BB962C8B-B14F-4D97-AF65-F5344CB8AC3E}">
-        <p14:creationId xmlns="" xmlns:p14="http://schemas.microsoft.com/office/powerpoint/2010/main" val="587479645"/>
+        <p14:creationId xmlns:p14="http://schemas.microsoft.com/office/powerpoint/2010/main" val="587479645"/>
       </p:ext>
     </p:extLst>
   </p:cSld>
@@ -4961,11 +4628,7 @@
           <a:p>
             <a:r>
               <a:rPr lang="en-US" dirty="0" smtClean="0"/>
-              <a:t>Design </a:t>
-            </a:r>
-            <a:r>
-              <a:rPr lang="en-US" dirty="0" smtClean="0"/>
-              <a:t>Process</a:t>
+              <a:t>Design Process</a:t>
             </a:r>
             <a:endParaRPr lang="en-US" dirty="0"/>
           </a:p>
@@ -4984,7 +4647,7 @@
         <p:spPr>
           <a:xfrm>
             <a:off x="1585244" y="2170632"/>
-            <a:ext cx="4976949" cy="1008404"/>
+            <a:ext cx="4976949" cy="3529524"/>
           </a:xfrm>
         </p:spPr>
         <p:txBody>
@@ -4995,111 +4658,48 @@
           <a:p>
             <a:r>
               <a:rPr lang="en-US" dirty="0" smtClean="0"/>
-              <a:t>Ideas</a:t>
-            </a:r>
-          </a:p>
-          <a:p>
-            <a:r>
-              <a:rPr lang="en-US" dirty="0" smtClean="0"/>
-              <a:t>Decision process</a:t>
-            </a:r>
+              <a:t>Proposals</a:t>
+            </a:r>
+          </a:p>
+          <a:p>
             <a:endParaRPr lang="en-US" dirty="0" smtClean="0"/>
           </a:p>
-        </p:txBody>
-      </p:sp>
-      <p:sp>
-        <p:nvSpPr>
-          <p:cNvPr id="5" name="Content Placeholder 2"/>
-          <p:cNvSpPr txBox="1">
-            <a:spLocks/>
-          </p:cNvSpPr>
-          <p:nvPr/>
-        </p:nvSpPr>
-        <p:spPr>
-          <a:xfrm>
-            <a:off x="1371600" y="1384419"/>
-            <a:ext cx="5086619" cy="538385"/>
-          </a:xfrm>
-          <a:prstGeom prst="rect">
-            <a:avLst/>
-          </a:prstGeom>
-        </p:spPr>
-        <p:txBody>
-          <a:bodyPr vert="horz" lIns="91440" tIns="45720" rIns="91440" bIns="45720" rtlCol="0">
-            <a:normAutofit/>
-          </a:bodyPr>
-          <a:lstStyle/>
-          <a:p>
-            <a:pPr marL="384048" marR="0" lvl="0" indent="-384048" algn="l" defTabSz="914400" rtl="0" eaLnBrk="1" fontAlgn="auto" latinLnBrk="0" hangingPunct="1">
-              <a:lnSpc>
-                <a:spcPct val="94000"/>
-              </a:lnSpc>
-              <a:spcBef>
-                <a:spcPts val="1000"/>
-              </a:spcBef>
-              <a:spcAft>
-                <a:spcPts val="200"/>
-              </a:spcAft>
-              <a:buClrTx/>
-              <a:buSzTx/>
-              <a:tabLst/>
-              <a:defRPr/>
-            </a:pPr>
-            <a:r>
-              <a:rPr kumimoji="0" lang="en-US" sz="2000" b="0" i="0" u="none" strike="noStrike" kern="1200" cap="none" spc="0" normalizeH="0" baseline="0" noProof="0" dirty="0" smtClean="0">
-                <a:ln>
-                  <a:noFill/>
-                </a:ln>
-                <a:solidFill>
-                  <a:schemeClr val="tx2"/>
-                </a:solidFill>
-                <a:effectLst/>
-                <a:uLnTx/>
-                <a:uFillTx/>
-                <a:latin typeface="+mn-lt"/>
-                <a:ea typeface="+mn-ea"/>
-                <a:cs typeface="+mn-cs"/>
-              </a:rPr>
-              <a:t> </a:t>
-            </a:r>
-            <a:r>
-              <a:rPr kumimoji="0" lang="en-US" sz="2800" b="0" i="1" u="none" strike="noStrike" kern="1200" cap="none" spc="0" normalizeH="0" baseline="0" noProof="0" dirty="0" smtClean="0">
-                <a:ln>
-                  <a:noFill/>
-                </a:ln>
-                <a:solidFill>
-                  <a:schemeClr val="tx2"/>
-                </a:solidFill>
-                <a:effectLst/>
-                <a:uLnTx/>
-                <a:uFillTx/>
-                <a:latin typeface="+mj-lt"/>
-                <a:ea typeface="+mn-ea"/>
-                <a:cs typeface="+mn-cs"/>
-              </a:rPr>
-              <a:t>What to make?</a:t>
-            </a:r>
-            <a:endParaRPr kumimoji="0" lang="en-US" sz="2000" b="0" i="1" u="none" strike="noStrike" kern="1200" cap="none" spc="0" normalizeH="0" baseline="0" noProof="0" dirty="0" smtClean="0">
-              <a:ln>
-                <a:noFill/>
-              </a:ln>
-              <a:solidFill>
-                <a:schemeClr val="tx2"/>
-              </a:solidFill>
-              <a:effectLst/>
-              <a:uLnTx/>
-              <a:uFillTx/>
-              <a:latin typeface="+mj-lt"/>
-              <a:ea typeface="+mn-ea"/>
-              <a:cs typeface="+mn-cs"/>
-            </a:endParaRPr>
+          <a:p>
+            <a:r>
+              <a:rPr lang="en-US" dirty="0" smtClean="0"/>
+              <a:t>Development</a:t>
+            </a:r>
+          </a:p>
+          <a:p>
+            <a:endParaRPr lang="en-US" dirty="0"/>
+          </a:p>
+          <a:p>
+            <a:r>
+              <a:rPr lang="en-US" dirty="0" smtClean="0"/>
+              <a:t>Deployment</a:t>
+            </a:r>
+          </a:p>
+          <a:p>
+            <a:endParaRPr lang="en-US" dirty="0"/>
+          </a:p>
+          <a:p>
+            <a:r>
+              <a:rPr lang="en-US" dirty="0" smtClean="0"/>
+              <a:t>Release</a:t>
+            </a:r>
+          </a:p>
+          <a:p>
+            <a:endParaRPr lang="en-US" dirty="0"/>
+          </a:p>
+          <a:p>
+            <a:endParaRPr lang="en-US" dirty="0" smtClean="0"/>
           </a:p>
         </p:txBody>
       </p:sp>
     </p:spTree>
     <p:extLst>
       <p:ext uri="{BB962C8B-B14F-4D97-AF65-F5344CB8AC3E}">
-        <p14:creationId xmlns="" xmlns:p14="http://schemas.microsoft.com/office/powerpoint/2010/main" val="1788068256"/>
+        <p14:creationId xmlns:p14="http://schemas.microsoft.com/office/powerpoint/2010/main" val="1788068256"/>
       </p:ext>
     </p:extLst>
   </p:cSld>
@@ -5143,340 +4743,146 @@
             <p:ph type="title"/>
           </p:nvPr>
         </p:nvSpPr>
-        <p:spPr>
-          <a:xfrm>
-            <a:off x="1371600" y="685800"/>
-            <a:ext cx="9601200" cy="880975"/>
-          </a:xfrm>
-        </p:spPr>
+        <p:spPr/>
         <p:txBody>
           <a:bodyPr/>
           <a:lstStyle/>
           <a:p>
             <a:r>
-              <a:rPr lang="en-US" dirty="0" smtClean="0"/>
-              <a:t>Design </a:t>
-            </a:r>
-            <a:r>
-              <a:rPr lang="en-US" dirty="0" smtClean="0"/>
-              <a:t>Process</a:t>
-            </a:r>
-            <a:endParaRPr lang="en-US" dirty="0"/>
-          </a:p>
-        </p:txBody>
-      </p:sp>
-      <p:sp>
-        <p:nvSpPr>
-          <p:cNvPr id="5" name="Content Placeholder 2"/>
-          <p:cNvSpPr txBox="1">
-            <a:spLocks/>
-          </p:cNvSpPr>
-          <p:nvPr/>
-        </p:nvSpPr>
-        <p:spPr>
-          <a:xfrm>
-            <a:off x="1371600" y="1384419"/>
-            <a:ext cx="5086619" cy="538385"/>
-          </a:xfrm>
-          <a:prstGeom prst="rect">
-            <a:avLst/>
-          </a:prstGeom>
-        </p:spPr>
-        <p:txBody>
-          <a:bodyPr vert="horz" lIns="91440" tIns="45720" rIns="91440" bIns="45720" rtlCol="0">
+              <a:rPr lang="en-US" dirty="0"/>
+              <a:t>T</a:t>
+            </a:r>
+            <a:r>
+              <a:rPr lang="en-US" dirty="0" smtClean="0"/>
+              <a:t>echnologies </a:t>
+            </a:r>
+            <a:r>
+              <a:rPr lang="en-US" dirty="0" smtClean="0"/>
+              <a:t>Used</a:t>
+            </a:r>
+            <a:endParaRPr lang="en-US" dirty="0"/>
+          </a:p>
+        </p:txBody>
+      </p:sp>
+      <p:sp>
+        <p:nvSpPr>
+          <p:cNvPr id="3" name="Content Placeholder 2"/>
+          <p:cNvSpPr>
+            <a:spLocks noGrp="1"/>
+          </p:cNvSpPr>
+          <p:nvPr>
+            <p:ph idx="1"/>
+          </p:nvPr>
+        </p:nvSpPr>
+        <p:spPr/>
+        <p:txBody>
+          <a:bodyPr numCol="2">
             <a:normAutofit/>
           </a:bodyPr>
           <a:lstStyle/>
           <a:p>
-            <a:pPr marL="384048" marR="0" lvl="0" indent="-384048" algn="l" defTabSz="914400" rtl="0" eaLnBrk="1" fontAlgn="auto" latinLnBrk="0" hangingPunct="1">
-              <a:lnSpc>
-                <a:spcPct val="94000"/>
-              </a:lnSpc>
-              <a:spcBef>
-                <a:spcPts val="1000"/>
-              </a:spcBef>
-              <a:spcAft>
-                <a:spcPts val="200"/>
-              </a:spcAft>
-              <a:buClrTx/>
-              <a:buSzTx/>
-              <a:tabLst/>
-              <a:defRPr/>
-            </a:pPr>
-            <a:r>
-              <a:rPr kumimoji="0" lang="en-US" sz="2000" b="0" i="0" u="none" strike="noStrike" kern="1200" cap="none" spc="0" normalizeH="0" baseline="0" noProof="0" dirty="0" smtClean="0">
-                <a:ln>
-                  <a:noFill/>
-                </a:ln>
-                <a:solidFill>
-                  <a:schemeClr val="tx2"/>
-                </a:solidFill>
-                <a:effectLst/>
-                <a:uLnTx/>
-                <a:uFillTx/>
-                <a:latin typeface="+mn-lt"/>
-                <a:ea typeface="+mn-ea"/>
-                <a:cs typeface="+mn-cs"/>
-              </a:rPr>
+            <a:r>
+              <a:rPr lang="en-US" dirty="0" smtClean="0"/>
+              <a:t>Wikipedia </a:t>
+            </a:r>
+            <a:r>
+              <a:rPr lang="en-US" dirty="0" smtClean="0"/>
+              <a:t>API</a:t>
+            </a:r>
+          </a:p>
+          <a:p>
+            <a:endParaRPr lang="en-US" dirty="0" smtClean="0"/>
+          </a:p>
+          <a:p>
+            <a:r>
+              <a:rPr lang="en-US" dirty="0" smtClean="0"/>
+              <a:t>JQuery Flip Plugin </a:t>
+            </a:r>
+            <a:endParaRPr lang="en-US" dirty="0" smtClean="0"/>
+          </a:p>
+          <a:p>
+            <a:endParaRPr lang="en-US" dirty="0" smtClean="0"/>
+          </a:p>
+          <a:p>
+            <a:r>
+              <a:rPr lang="en-US" dirty="0" smtClean="0"/>
+              <a:t>Google </a:t>
+            </a:r>
+            <a:r>
+              <a:rPr lang="en-US" dirty="0" smtClean="0"/>
+              <a:t>Sign-In via Firebase </a:t>
+            </a:r>
+            <a:endParaRPr lang="en-US" dirty="0" smtClean="0"/>
+          </a:p>
+          <a:p>
+            <a:endParaRPr lang="en-US" dirty="0" smtClean="0"/>
+          </a:p>
+          <a:p>
+            <a:r>
+              <a:rPr lang="en-US" dirty="0" err="1" smtClean="0"/>
+              <a:t>Giphy</a:t>
+            </a:r>
+            <a:r>
+              <a:rPr lang="en-US" dirty="0" smtClean="0"/>
+              <a:t> API</a:t>
+            </a:r>
+          </a:p>
+          <a:p>
+            <a:endParaRPr lang="en-US" dirty="0" smtClean="0"/>
+          </a:p>
+          <a:p>
+            <a:r>
+              <a:rPr lang="en-US" dirty="0" err="1" smtClean="0"/>
+              <a:t>Draw.io</a:t>
+            </a:r>
+            <a:r>
+              <a:rPr lang="en-US" dirty="0" smtClean="0"/>
               <a:t> </a:t>
             </a:r>
-            <a:r>
-              <a:rPr kumimoji="0" lang="en-US" sz="2800" b="0" i="1" u="none" strike="noStrike" kern="1200" cap="none" spc="0" normalizeH="0" baseline="0" noProof="0" dirty="0" smtClean="0">
-                <a:ln>
-                  <a:noFill/>
-                </a:ln>
-                <a:solidFill>
-                  <a:schemeClr val="tx2"/>
-                </a:solidFill>
-                <a:effectLst/>
-                <a:uLnTx/>
-                <a:uFillTx/>
-                <a:latin typeface="+mj-lt"/>
-                <a:ea typeface="+mn-ea"/>
-                <a:cs typeface="+mn-cs"/>
-              </a:rPr>
-              <a:t>Development</a:t>
-            </a:r>
-            <a:endParaRPr kumimoji="0" lang="en-US" sz="2000" b="0" i="1" u="none" strike="noStrike" kern="1200" cap="none" spc="0" normalizeH="0" baseline="0" noProof="0" dirty="0" smtClean="0">
-              <a:ln>
-                <a:noFill/>
-              </a:ln>
-              <a:solidFill>
-                <a:schemeClr val="tx2"/>
-              </a:solidFill>
-              <a:effectLst/>
-              <a:uLnTx/>
-              <a:uFillTx/>
-              <a:latin typeface="+mj-lt"/>
-              <a:ea typeface="+mn-ea"/>
-              <a:cs typeface="+mn-cs"/>
-            </a:endParaRPr>
-          </a:p>
-        </p:txBody>
-      </p:sp>
-      <p:sp>
-        <p:nvSpPr>
-          <p:cNvPr id="6" name="Content Placeholder 5"/>
-          <p:cNvSpPr>
-            <a:spLocks noGrp="1"/>
-          </p:cNvSpPr>
-          <p:nvPr>
-            <p:ph idx="1"/>
-          </p:nvPr>
-        </p:nvSpPr>
-        <p:spPr>
-          <a:xfrm>
-            <a:off x="1371600" y="2820112"/>
-            <a:ext cx="4533544" cy="3047288"/>
-          </a:xfrm>
-        </p:spPr>
-        <p:txBody>
-          <a:bodyPr>
-            <a:normAutofit/>
-          </a:bodyPr>
-          <a:lstStyle/>
-          <a:p>
-            <a:r>
-              <a:rPr lang="en-US" dirty="0" smtClean="0"/>
-              <a:t>Staying focused (scope creep</a:t>
-            </a:r>
-            <a:r>
-              <a:rPr lang="en-US" dirty="0" smtClean="0"/>
-              <a:t>)</a:t>
-            </a:r>
-          </a:p>
-          <a:p>
+          </a:p>
+          <a:p>
+            <a:endParaRPr lang="en-US" dirty="0"/>
+          </a:p>
+          <a:p>
+            <a:r>
+              <a:rPr lang="en-US" dirty="0" err="1" smtClean="0"/>
+              <a:t>Pnotify</a:t>
+            </a:r>
             <a:endParaRPr lang="en-US" dirty="0" smtClean="0"/>
           </a:p>
           <a:p>
-            <a:r>
-              <a:rPr lang="en-US" dirty="0" smtClean="0"/>
-              <a:t>Create Wireframe, HTML, and </a:t>
-            </a:r>
-            <a:r>
-              <a:rPr lang="en-US" dirty="0" smtClean="0"/>
-              <a:t>CSS</a:t>
-            </a:r>
-          </a:p>
-          <a:p>
             <a:endParaRPr lang="en-US" dirty="0" smtClean="0"/>
           </a:p>
           <a:p>
             <a:r>
-              <a:rPr lang="en-US" dirty="0" smtClean="0"/>
-              <a:t>Research APIs/Implementation</a:t>
-            </a:r>
-          </a:p>
-          <a:p>
-            <a:pPr>
-              <a:buNone/>
-            </a:pPr>
-            <a:endParaRPr lang="en-US" dirty="0"/>
-          </a:p>
-        </p:txBody>
-      </p:sp>
-      <p:sp>
-        <p:nvSpPr>
-          <p:cNvPr id="7" name="Content Placeholder 5"/>
-          <p:cNvSpPr txBox="1">
-            <a:spLocks/>
-          </p:cNvSpPr>
-          <p:nvPr/>
-        </p:nvSpPr>
-        <p:spPr>
-          <a:xfrm>
-            <a:off x="6439256" y="2820112"/>
-            <a:ext cx="4533544" cy="3020222"/>
-          </a:xfrm>
-          <a:prstGeom prst="rect">
-            <a:avLst/>
-          </a:prstGeom>
-        </p:spPr>
-        <p:txBody>
-          <a:bodyPr vert="horz" lIns="91440" tIns="45720" rIns="91440" bIns="45720" rtlCol="0">
-            <a:normAutofit/>
-          </a:bodyPr>
-          <a:lstStyle/>
-          <a:p>
-            <a:pPr marL="384048" marR="0" lvl="0" indent="-384048" algn="l" defTabSz="914400" rtl="0" eaLnBrk="1" fontAlgn="auto" latinLnBrk="0" hangingPunct="1">
-              <a:lnSpc>
-                <a:spcPct val="94000"/>
-              </a:lnSpc>
-              <a:spcBef>
-                <a:spcPts val="1000"/>
-              </a:spcBef>
-              <a:spcAft>
-                <a:spcPts val="200"/>
-              </a:spcAft>
-              <a:buClrTx/>
-              <a:buSzTx/>
-              <a:buFont typeface="Franklin Gothic Book" panose="020B0503020102020204" pitchFamily="34" charset="0"/>
-              <a:buChar char="■"/>
-              <a:tabLst/>
-              <a:defRPr/>
-            </a:pPr>
-            <a:r>
-              <a:rPr kumimoji="0" lang="en-US" sz="2000" b="0" i="0" u="none" strike="noStrike" kern="1200" cap="none" spc="0" normalizeH="0" baseline="0" noProof="0" dirty="0" smtClean="0">
-                <a:ln>
-                  <a:noFill/>
-                </a:ln>
-                <a:solidFill>
-                  <a:schemeClr val="tx2"/>
-                </a:solidFill>
-                <a:effectLst/>
-                <a:uLnTx/>
-                <a:uFillTx/>
-                <a:latin typeface="+mn-lt"/>
-                <a:ea typeface="+mn-ea"/>
-                <a:cs typeface="+mn-cs"/>
-              </a:rPr>
-              <a:t>Daily</a:t>
-            </a:r>
-            <a:r>
-              <a:rPr kumimoji="0" lang="en-US" sz="2000" b="0" i="0" u="none" strike="noStrike" kern="1200" cap="none" spc="0" normalizeH="0" noProof="0" dirty="0" smtClean="0">
-                <a:ln>
-                  <a:noFill/>
-                </a:ln>
-                <a:solidFill>
-                  <a:schemeClr val="tx2"/>
-                </a:solidFill>
-                <a:effectLst/>
-                <a:uLnTx/>
-                <a:uFillTx/>
-                <a:latin typeface="+mn-lt"/>
-                <a:ea typeface="+mn-ea"/>
-                <a:cs typeface="+mn-cs"/>
-              </a:rPr>
-              <a:t> “</a:t>
-            </a:r>
-            <a:r>
-              <a:rPr kumimoji="0" lang="en-US" sz="2000" b="0" i="0" u="none" strike="noStrike" kern="1200" cap="none" spc="0" normalizeH="0" noProof="0" dirty="0" err="1" smtClean="0">
-                <a:ln>
-                  <a:noFill/>
-                </a:ln>
-                <a:solidFill>
-                  <a:schemeClr val="tx2"/>
-                </a:solidFill>
-                <a:effectLst/>
-                <a:uLnTx/>
-                <a:uFillTx/>
-                <a:latin typeface="+mn-lt"/>
-                <a:ea typeface="+mn-ea"/>
-                <a:cs typeface="+mn-cs"/>
-              </a:rPr>
-              <a:t>Standups</a:t>
-            </a:r>
-            <a:r>
-              <a:rPr kumimoji="0" lang="en-US" sz="2000" b="0" i="0" u="none" strike="noStrike" kern="1200" cap="none" spc="0" normalizeH="0" noProof="0" dirty="0" smtClean="0">
-                <a:ln>
-                  <a:noFill/>
-                </a:ln>
-                <a:solidFill>
-                  <a:schemeClr val="tx2"/>
-                </a:solidFill>
-                <a:effectLst/>
-                <a:uLnTx/>
-                <a:uFillTx/>
-                <a:latin typeface="+mn-lt"/>
-                <a:ea typeface="+mn-ea"/>
-                <a:cs typeface="+mn-cs"/>
-              </a:rPr>
-              <a:t>”</a:t>
-            </a:r>
-            <a:endParaRPr kumimoji="0" lang="en-US" sz="2000" b="0" i="0" u="none" strike="noStrike" kern="1200" cap="none" spc="0" normalizeH="0" baseline="0" noProof="0" dirty="0" smtClean="0">
-              <a:ln>
-                <a:noFill/>
-              </a:ln>
-              <a:solidFill>
-                <a:schemeClr val="tx2"/>
-              </a:solidFill>
-              <a:effectLst/>
-              <a:uLnTx/>
-              <a:uFillTx/>
-              <a:latin typeface="+mn-lt"/>
-              <a:ea typeface="+mn-ea"/>
-              <a:cs typeface="+mn-cs"/>
-            </a:endParaRPr>
-          </a:p>
-          <a:p>
-            <a:pPr marL="384048" marR="0" lvl="0" indent="-384048" algn="l" defTabSz="914400" rtl="0" eaLnBrk="1" fontAlgn="auto" latinLnBrk="0" hangingPunct="1">
-              <a:lnSpc>
-                <a:spcPct val="94000"/>
-              </a:lnSpc>
-              <a:spcBef>
-                <a:spcPts val="1000"/>
-              </a:spcBef>
-              <a:spcAft>
-                <a:spcPts val="200"/>
-              </a:spcAft>
-              <a:buClrTx/>
-              <a:buSzTx/>
-              <a:buFont typeface="Franklin Gothic Book" panose="020B0503020102020204" pitchFamily="34" charset="0"/>
-              <a:buChar char="■"/>
-              <a:tabLst/>
-              <a:defRPr/>
-            </a:pPr>
-            <a:endParaRPr kumimoji="0" lang="en-US" sz="2000" b="0" i="0" u="none" strike="noStrike" kern="1200" cap="none" spc="0" normalizeH="0" baseline="0" noProof="0" dirty="0">
-              <a:ln>
-                <a:noFill/>
-              </a:ln>
-              <a:solidFill>
-                <a:schemeClr val="tx2"/>
-              </a:solidFill>
-              <a:effectLst/>
-              <a:uLnTx/>
-              <a:uFillTx/>
-              <a:latin typeface="+mn-lt"/>
-              <a:ea typeface="+mn-ea"/>
-              <a:cs typeface="+mn-cs"/>
-            </a:endParaRPr>
+              <a:rPr lang="en-US" dirty="0" err="1" smtClean="0"/>
+              <a:t>Pixlr</a:t>
+            </a:r>
+            <a:r>
+              <a:rPr lang="en-US" dirty="0" smtClean="0"/>
+              <a:t> </a:t>
+            </a:r>
+            <a:r>
+              <a:rPr lang="en-US" dirty="0" smtClean="0"/>
+              <a:t>Editor</a:t>
+            </a:r>
+          </a:p>
+          <a:p>
+            <a:endParaRPr lang="en-US" dirty="0"/>
+          </a:p>
+          <a:p>
+            <a:r>
+              <a:rPr lang="en-US" dirty="0" smtClean="0"/>
+              <a:t>Trello</a:t>
+            </a:r>
+            <a:endParaRPr lang="en-US" dirty="0" smtClean="0"/>
           </a:p>
         </p:txBody>
       </p:sp>
     </p:spTree>
     <p:extLst>
       <p:ext uri="{BB962C8B-B14F-4D97-AF65-F5344CB8AC3E}">
-        <p14:creationId xmlns="" xmlns:p14="http://schemas.microsoft.com/office/powerpoint/2010/main" val="1788068256"/>
+        <p14:creationId xmlns:p14="http://schemas.microsoft.com/office/powerpoint/2010/main" val="177022474"/>
       </p:ext>
     </p:extLst>
   </p:cSld>
@@ -5520,190 +4926,41 @@
             <p:ph type="title"/>
           </p:nvPr>
         </p:nvSpPr>
-        <p:spPr>
-          <a:xfrm>
-            <a:off x="1371600" y="685800"/>
-            <a:ext cx="9601200" cy="880975"/>
-          </a:xfrm>
-        </p:spPr>
+        <p:spPr/>
         <p:txBody>
           <a:bodyPr/>
           <a:lstStyle/>
           <a:p>
             <a:r>
               <a:rPr lang="en-US" dirty="0" smtClean="0"/>
-              <a:t>Design </a:t>
-            </a:r>
-            <a:r>
-              <a:rPr lang="en-US" dirty="0" smtClean="0"/>
-              <a:t>Process</a:t>
-            </a:r>
-            <a:endParaRPr lang="en-US" dirty="0"/>
-          </a:p>
-        </p:txBody>
-      </p:sp>
-      <p:sp>
-        <p:nvSpPr>
-          <p:cNvPr id="5" name="Content Placeholder 2"/>
-          <p:cNvSpPr txBox="1">
-            <a:spLocks/>
-          </p:cNvSpPr>
-          <p:nvPr/>
-        </p:nvSpPr>
-        <p:spPr>
-          <a:xfrm>
-            <a:off x="1371600" y="1384419"/>
-            <a:ext cx="5086619" cy="538385"/>
-          </a:xfrm>
-          <a:prstGeom prst="rect">
-            <a:avLst/>
-          </a:prstGeom>
-        </p:spPr>
-        <p:txBody>
-          <a:bodyPr vert="horz" lIns="91440" tIns="45720" rIns="91440" bIns="45720" rtlCol="0">
-            <a:normAutofit/>
-          </a:bodyPr>
+              <a:t>Demo</a:t>
+            </a:r>
+            <a:endParaRPr lang="en-US" dirty="0"/>
+          </a:p>
+        </p:txBody>
+      </p:sp>
+      <p:sp>
+        <p:nvSpPr>
+          <p:cNvPr id="3" name="Content Placeholder 2"/>
+          <p:cNvSpPr>
+            <a:spLocks noGrp="1"/>
+          </p:cNvSpPr>
+          <p:nvPr>
+            <p:ph idx="1"/>
+          </p:nvPr>
+        </p:nvSpPr>
+        <p:spPr/>
+        <p:txBody>
+          <a:bodyPr/>
           <a:lstStyle/>
           <a:p>
-            <a:pPr marL="384048" marR="0" lvl="0" indent="-384048" algn="l" defTabSz="914400" rtl="0" eaLnBrk="1" fontAlgn="auto" latinLnBrk="0" hangingPunct="1">
-              <a:lnSpc>
-                <a:spcPct val="94000"/>
-              </a:lnSpc>
-              <a:spcBef>
-                <a:spcPts val="1000"/>
-              </a:spcBef>
-              <a:spcAft>
-                <a:spcPts val="200"/>
-              </a:spcAft>
-              <a:buClrTx/>
-              <a:buSzTx/>
-              <a:tabLst/>
-              <a:defRPr/>
-            </a:pPr>
-            <a:r>
-              <a:rPr kumimoji="0" lang="en-US" sz="2000" b="0" i="0" u="none" strike="noStrike" kern="1200" cap="none" spc="0" normalizeH="0" baseline="0" noProof="0" dirty="0" smtClean="0">
-                <a:ln>
-                  <a:noFill/>
-                </a:ln>
-                <a:solidFill>
-                  <a:schemeClr val="tx2"/>
-                </a:solidFill>
-                <a:effectLst/>
-                <a:uLnTx/>
-                <a:uFillTx/>
-                <a:latin typeface="+mn-lt"/>
-                <a:ea typeface="+mn-ea"/>
-                <a:cs typeface="+mn-cs"/>
+            <a:r>
+              <a:rPr lang="en-US" dirty="0" smtClean="0">
+                <a:hlinkClick r:id="rId2"/>
               </a:rPr>
-              <a:t> </a:t>
-            </a:r>
-            <a:r>
-              <a:rPr kumimoji="0" lang="en-US" sz="2800" b="0" i="1" u="none" strike="noStrike" kern="1200" cap="none" spc="0" normalizeH="0" baseline="0" noProof="0" dirty="0" smtClean="0">
-                <a:ln>
-                  <a:noFill/>
-                </a:ln>
-                <a:solidFill>
-                  <a:schemeClr val="tx2"/>
-                </a:solidFill>
-                <a:effectLst/>
-                <a:uLnTx/>
-                <a:uFillTx/>
-                <a:latin typeface="+mj-lt"/>
-                <a:ea typeface="+mn-ea"/>
-                <a:cs typeface="+mn-cs"/>
-              </a:rPr>
-              <a:t>Development</a:t>
-            </a:r>
-            <a:endParaRPr kumimoji="0" lang="en-US" sz="2000" b="0" i="1" u="none" strike="noStrike" kern="1200" cap="none" spc="0" normalizeH="0" baseline="0" noProof="0" dirty="0" smtClean="0">
-              <a:ln>
-                <a:noFill/>
-              </a:ln>
-              <a:solidFill>
-                <a:schemeClr val="tx2"/>
-              </a:solidFill>
-              <a:effectLst/>
-              <a:uLnTx/>
-              <a:uFillTx/>
-              <a:latin typeface="+mj-lt"/>
-              <a:ea typeface="+mn-ea"/>
-              <a:cs typeface="+mn-cs"/>
-            </a:endParaRPr>
-          </a:p>
-        </p:txBody>
-      </p:sp>
-      <p:sp>
-        <p:nvSpPr>
-          <p:cNvPr id="6" name="Content Placeholder 5"/>
-          <p:cNvSpPr>
-            <a:spLocks noGrp="1"/>
-          </p:cNvSpPr>
-          <p:nvPr>
-            <p:ph idx="1"/>
-          </p:nvPr>
-        </p:nvSpPr>
-        <p:spPr/>
-        <p:txBody>
-          <a:bodyPr>
-            <a:normAutofit fontScale="92500" lnSpcReduction="10000"/>
-          </a:bodyPr>
-          <a:lstStyle/>
-          <a:p>
-            <a:r>
-              <a:rPr lang="en-US" dirty="0" smtClean="0"/>
-              <a:t>Staying focused (scope creep)</a:t>
-            </a:r>
-          </a:p>
-          <a:p>
-            <a:r>
-              <a:rPr lang="en-US" dirty="0" smtClean="0"/>
-              <a:t>Create Wireframe, HTML, and CSS</a:t>
-            </a:r>
-          </a:p>
-          <a:p>
-            <a:r>
-              <a:rPr lang="en-US" dirty="0" smtClean="0"/>
-              <a:t>Research APIs/Implementation</a:t>
-            </a:r>
-          </a:p>
-          <a:p>
-            <a:r>
-              <a:rPr lang="en-US" dirty="0" err="1" smtClean="0"/>
-              <a:t>Pseudocode</a:t>
-            </a:r>
-            <a:r>
-              <a:rPr lang="en-US" dirty="0" smtClean="0"/>
-              <a:t> and Write JavaScript</a:t>
-            </a:r>
-          </a:p>
-          <a:p>
-            <a:r>
-              <a:rPr lang="en-US" dirty="0" smtClean="0"/>
-              <a:t>Database Design</a:t>
-            </a:r>
-          </a:p>
-          <a:p>
-            <a:r>
-              <a:rPr lang="en-US" dirty="0" smtClean="0"/>
-              <a:t>Connecting HTML and JavaScript</a:t>
-            </a:r>
-          </a:p>
-          <a:p>
-            <a:r>
-              <a:rPr lang="en-US" dirty="0" smtClean="0"/>
-              <a:t>Debugging</a:t>
-            </a:r>
-          </a:p>
-          <a:p>
-            <a:r>
-              <a:rPr lang="en-US" dirty="0" smtClean="0"/>
-              <a:t>Add/Discussion of New Features</a:t>
-            </a:r>
-          </a:p>
-          <a:p>
-            <a:r>
-              <a:rPr lang="en-US" dirty="0" smtClean="0"/>
-              <a:t>Marketing Plan</a:t>
-            </a:r>
+              <a:t>codeDeck</a:t>
+            </a:r>
+            <a:endParaRPr lang="en-US" dirty="0" smtClean="0"/>
           </a:p>
           <a:p>
             <a:endParaRPr lang="en-US" dirty="0"/>
@@ -5713,7 +4970,7 @@
     </p:spTree>
     <p:extLst>
       <p:ext uri="{BB962C8B-B14F-4D97-AF65-F5344CB8AC3E}">
-        <p14:creationId xmlns="" xmlns:p14="http://schemas.microsoft.com/office/powerpoint/2010/main" val="1788068256"/>
+        <p14:creationId xmlns:p14="http://schemas.microsoft.com/office/powerpoint/2010/main" val="1463705858"/>
       </p:ext>
     </p:extLst>
   </p:cSld>
@@ -5757,31 +5014,26 @@
             <p:ph type="title"/>
           </p:nvPr>
         </p:nvSpPr>
-        <p:spPr>
-          <a:xfrm>
-            <a:off x="1371600" y="685800"/>
-            <a:ext cx="9601200" cy="880975"/>
-          </a:xfrm>
-        </p:spPr>
+        <p:spPr/>
         <p:txBody>
           <a:bodyPr/>
           <a:lstStyle/>
           <a:p>
             <a:r>
-              <a:rPr lang="en-US" dirty="0" smtClean="0"/>
-              <a:t>Design </a:t>
-            </a:r>
-            <a:r>
-              <a:rPr lang="en-US" dirty="0" smtClean="0"/>
-              <a:t>Process</a:t>
-            </a:r>
-            <a:endParaRPr lang="en-US" dirty="0"/>
-          </a:p>
-        </p:txBody>
-      </p:sp>
-      <p:sp>
-        <p:nvSpPr>
-          <p:cNvPr id="3" name="Content Placeholder 2"/>
+              <a:rPr lang="en-US" dirty="0"/>
+              <a:t>Directions for </a:t>
+            </a:r>
+            <a:r>
+              <a:rPr lang="en-US" dirty="0" smtClean="0"/>
+              <a:t>Future Development</a:t>
+            </a:r>
+            <a:endParaRPr lang="en-US" dirty="0"/>
+          </a:p>
+        </p:txBody>
+      </p:sp>
+      <p:sp>
+        <p:nvSpPr>
+          <p:cNvPr id="5" name="Content Placeholder 4"/>
           <p:cNvSpPr>
             <a:spLocks noGrp="1"/>
           </p:cNvSpPr>
@@ -5789,383 +5041,50 @@
             <p:ph idx="1"/>
           </p:nvPr>
         </p:nvSpPr>
-        <p:spPr>
-          <a:xfrm>
-            <a:off x="1371599" y="1586753"/>
-            <a:ext cx="4976949" cy="5138137"/>
-          </a:xfrm>
-        </p:spPr>
-        <p:txBody>
-          <a:bodyPr>
-            <a:normAutofit lnSpcReduction="10000"/>
-          </a:bodyPr>
+        <p:spPr/>
+        <p:txBody>
+          <a:bodyPr numCol="2"/>
           <a:lstStyle/>
           <a:p>
             <a:r>
               <a:rPr lang="en-US" dirty="0" smtClean="0"/>
-              <a:t> </a:t>
-            </a:r>
-            <a:r>
-              <a:rPr lang="en-US" dirty="0" smtClean="0"/>
-              <a:t>What to make?</a:t>
-            </a:r>
-          </a:p>
-          <a:p>
-            <a:pPr lvl="1"/>
-            <a:r>
-              <a:rPr lang="en-US" dirty="0" smtClean="0"/>
-              <a:t>Ideas</a:t>
-            </a:r>
-          </a:p>
-          <a:p>
-            <a:pPr lvl="1"/>
-            <a:r>
-              <a:rPr lang="en-US" dirty="0" smtClean="0"/>
-              <a:t>Group decision making</a:t>
-            </a:r>
+              <a:t>Additional Decks</a:t>
+            </a:r>
+          </a:p>
+          <a:p>
             <a:endParaRPr lang="en-US" dirty="0" smtClean="0"/>
           </a:p>
           <a:p>
             <a:r>
               <a:rPr lang="en-US" dirty="0" smtClean="0"/>
-              <a:t>Development</a:t>
-            </a:r>
-          </a:p>
-          <a:p>
-            <a:pPr lvl="1"/>
-            <a:r>
-              <a:rPr lang="en-US" dirty="0" smtClean="0"/>
-              <a:t>Staying focused (scope creep)</a:t>
+              <a:t>Quiz</a:t>
             </a:r>
             <a:endParaRPr lang="en-US" dirty="0" smtClean="0"/>
           </a:p>
           <a:p>
-            <a:pPr lvl="1"/>
-            <a:r>
-              <a:rPr lang="en-US" dirty="0" smtClean="0"/>
-              <a:t>Create Wireframe, HTML, and CSS</a:t>
-            </a:r>
-          </a:p>
-          <a:p>
-            <a:pPr lvl="1"/>
-            <a:r>
-              <a:rPr lang="en-US" dirty="0" smtClean="0"/>
-              <a:t>Research APIs/Implementation</a:t>
-            </a:r>
-          </a:p>
-          <a:p>
-            <a:pPr lvl="1"/>
-            <a:r>
-              <a:rPr lang="en-US" dirty="0" err="1" smtClean="0"/>
-              <a:t>Pseudocode</a:t>
-            </a:r>
-            <a:r>
-              <a:rPr lang="en-US" dirty="0" smtClean="0"/>
-              <a:t> and Write JavaScript</a:t>
-            </a:r>
-          </a:p>
-          <a:p>
-            <a:pPr lvl="1"/>
-            <a:r>
-              <a:rPr lang="en-US" dirty="0" smtClean="0"/>
-              <a:t>Database Design</a:t>
-            </a:r>
-          </a:p>
-          <a:p>
-            <a:pPr lvl="1"/>
-            <a:r>
-              <a:rPr lang="en-US" dirty="0" smtClean="0"/>
-              <a:t>Connecting HTML and JavaScript</a:t>
-            </a:r>
-          </a:p>
-          <a:p>
-            <a:pPr lvl="1"/>
-            <a:r>
-              <a:rPr lang="en-US" dirty="0" smtClean="0"/>
-              <a:t>Debugging</a:t>
-            </a:r>
-          </a:p>
-          <a:p>
-            <a:pPr lvl="1"/>
-            <a:r>
-              <a:rPr lang="en-US" dirty="0" smtClean="0"/>
-              <a:t>Add/Discussion of New Features</a:t>
-            </a:r>
-          </a:p>
-          <a:p>
-            <a:pPr lvl="1"/>
-            <a:r>
-              <a:rPr lang="en-US" dirty="0" smtClean="0"/>
-              <a:t>Marketing Plan</a:t>
-            </a:r>
-            <a:endParaRPr lang="en-US" dirty="0"/>
-          </a:p>
-        </p:txBody>
-      </p:sp>
-      <p:sp>
-        <p:nvSpPr>
-          <p:cNvPr id="4" name="Content Placeholder 2"/>
-          <p:cNvSpPr txBox="1">
-            <a:spLocks/>
-          </p:cNvSpPr>
-          <p:nvPr/>
-        </p:nvSpPr>
-        <p:spPr>
-          <a:xfrm>
-            <a:off x="6642847" y="1566775"/>
-            <a:ext cx="4329953" cy="5138137"/>
-          </a:xfrm>
-          <a:prstGeom prst="rect">
-            <a:avLst/>
-          </a:prstGeom>
-        </p:spPr>
-        <p:txBody>
-          <a:bodyPr vert="horz" lIns="91440" tIns="45720" rIns="91440" bIns="45720" rtlCol="0">
-            <a:normAutofit/>
-          </a:bodyPr>
-          <a:lstStyle>
-            <a:lvl1pPr marL="384048" indent="-384048" algn="l" defTabSz="914400" rtl="0" eaLnBrk="1" latinLnBrk="0" hangingPunct="1">
-              <a:lnSpc>
-                <a:spcPct val="94000"/>
-              </a:lnSpc>
-              <a:spcBef>
-                <a:spcPts val="1000"/>
-              </a:spcBef>
-              <a:spcAft>
-                <a:spcPts val="200"/>
-              </a:spcAft>
-              <a:buFont typeface="Franklin Gothic Book" panose="020B0503020102020204" pitchFamily="34" charset="0"/>
-              <a:buChar char="■"/>
-              <a:defRPr sz="2000" kern="1200" baseline="0">
-                <a:solidFill>
-                  <a:schemeClr val="tx2"/>
-                </a:solidFill>
-                <a:latin typeface="+mn-lt"/>
-                <a:ea typeface="+mn-ea"/>
-                <a:cs typeface="+mn-cs"/>
-              </a:defRPr>
-            </a:lvl1pPr>
-            <a:lvl2pPr marL="914400" indent="-384048" algn="l" defTabSz="914400" rtl="0" eaLnBrk="1" latinLnBrk="0" hangingPunct="1">
-              <a:lnSpc>
-                <a:spcPct val="94000"/>
-              </a:lnSpc>
-              <a:spcBef>
-                <a:spcPts val="500"/>
-              </a:spcBef>
-              <a:spcAft>
-                <a:spcPts val="200"/>
-              </a:spcAft>
-              <a:buFont typeface="Franklin Gothic Book" panose="020B0503020102020204" pitchFamily="34" charset="0"/>
-              <a:buChar char="–"/>
-              <a:defRPr sz="2000" i="1" kern="1200" baseline="0">
-                <a:solidFill>
-                  <a:schemeClr val="tx2"/>
-                </a:solidFill>
-                <a:latin typeface="+mn-lt"/>
-                <a:ea typeface="+mn-ea"/>
-                <a:cs typeface="+mn-cs"/>
-              </a:defRPr>
-            </a:lvl2pPr>
-            <a:lvl3pPr marL="1371600" indent="-384048" algn="l" defTabSz="914400" rtl="0" eaLnBrk="1" latinLnBrk="0" hangingPunct="1">
-              <a:lnSpc>
-                <a:spcPct val="94000"/>
-              </a:lnSpc>
-              <a:spcBef>
-                <a:spcPts val="500"/>
-              </a:spcBef>
-              <a:spcAft>
-                <a:spcPts val="200"/>
-              </a:spcAft>
-              <a:buFont typeface="Franklin Gothic Book" panose="020B0503020102020204" pitchFamily="34" charset="0"/>
-              <a:buChar char="■"/>
-              <a:defRPr sz="1800" kern="1200" baseline="0">
-                <a:solidFill>
-                  <a:schemeClr val="tx2"/>
-                </a:solidFill>
-                <a:latin typeface="+mn-lt"/>
-                <a:ea typeface="+mn-ea"/>
-                <a:cs typeface="+mn-cs"/>
-              </a:defRPr>
-            </a:lvl3pPr>
-            <a:lvl4pPr marL="1828800" indent="-384048" algn="l" defTabSz="914400" rtl="0" eaLnBrk="1" latinLnBrk="0" hangingPunct="1">
-              <a:lnSpc>
-                <a:spcPct val="94000"/>
-              </a:lnSpc>
-              <a:spcBef>
-                <a:spcPts val="500"/>
-              </a:spcBef>
-              <a:spcAft>
-                <a:spcPts val="200"/>
-              </a:spcAft>
-              <a:buFont typeface="Franklin Gothic Book" panose="020B0503020102020204" pitchFamily="34" charset="0"/>
-              <a:buChar char="–"/>
-              <a:defRPr sz="1800" i="1" kern="1200" baseline="0">
-                <a:solidFill>
-                  <a:schemeClr val="tx2"/>
-                </a:solidFill>
-                <a:latin typeface="+mn-lt"/>
-                <a:ea typeface="+mn-ea"/>
-                <a:cs typeface="+mn-cs"/>
-              </a:defRPr>
-            </a:lvl4pPr>
-            <a:lvl5pPr marL="2286000" indent="-384048" algn="l" defTabSz="914400" rtl="0" eaLnBrk="1" latinLnBrk="0" hangingPunct="1">
-              <a:lnSpc>
-                <a:spcPct val="94000"/>
-              </a:lnSpc>
-              <a:spcBef>
-                <a:spcPts val="500"/>
-              </a:spcBef>
-              <a:spcAft>
-                <a:spcPts val="200"/>
-              </a:spcAft>
-              <a:buFont typeface="Franklin Gothic Book" panose="020B0503020102020204" pitchFamily="34" charset="0"/>
-              <a:buChar char="■"/>
-              <a:defRPr sz="1600" kern="1200" baseline="0">
-                <a:solidFill>
-                  <a:schemeClr val="tx2"/>
-                </a:solidFill>
-                <a:latin typeface="+mn-lt"/>
-                <a:ea typeface="+mn-ea"/>
-                <a:cs typeface="+mn-cs"/>
-              </a:defRPr>
-            </a:lvl5pPr>
-            <a:lvl6pPr marL="2743200" indent="-384048" algn="l" defTabSz="914400" rtl="0" eaLnBrk="1" latinLnBrk="0" hangingPunct="1">
-              <a:lnSpc>
-                <a:spcPct val="94000"/>
-              </a:lnSpc>
-              <a:spcBef>
-                <a:spcPts val="500"/>
-              </a:spcBef>
-              <a:spcAft>
-                <a:spcPts val="200"/>
-              </a:spcAft>
-              <a:buFont typeface="Franklin Gothic Book" panose="020B0503020102020204" pitchFamily="34" charset="0"/>
-              <a:buChar char="–"/>
-              <a:defRPr sz="1600" i="1" kern="1200" baseline="0">
-                <a:solidFill>
-                  <a:schemeClr val="tx2"/>
-                </a:solidFill>
-                <a:latin typeface="+mn-lt"/>
-                <a:ea typeface="+mn-ea"/>
-                <a:cs typeface="+mn-cs"/>
-              </a:defRPr>
-            </a:lvl6pPr>
-            <a:lvl7pPr marL="3200400" indent="-384048" algn="l" defTabSz="914400" rtl="0" eaLnBrk="1" latinLnBrk="0" hangingPunct="1">
-              <a:lnSpc>
-                <a:spcPct val="94000"/>
-              </a:lnSpc>
-              <a:spcBef>
-                <a:spcPts val="500"/>
-              </a:spcBef>
-              <a:spcAft>
-                <a:spcPts val="200"/>
-              </a:spcAft>
-              <a:buFont typeface="Franklin Gothic Book" panose="020B0503020102020204" pitchFamily="34" charset="0"/>
-              <a:buChar char="■"/>
-              <a:defRPr sz="1400" kern="1200" baseline="0">
-                <a:solidFill>
-                  <a:schemeClr val="tx2"/>
-                </a:solidFill>
-                <a:latin typeface="+mn-lt"/>
-                <a:ea typeface="+mn-ea"/>
-                <a:cs typeface="+mn-cs"/>
-              </a:defRPr>
-            </a:lvl7pPr>
-            <a:lvl8pPr marL="3657600" indent="-384048" algn="l" defTabSz="914400" rtl="0" eaLnBrk="1" latinLnBrk="0" hangingPunct="1">
-              <a:lnSpc>
-                <a:spcPct val="94000"/>
-              </a:lnSpc>
-              <a:spcBef>
-                <a:spcPts val="500"/>
-              </a:spcBef>
-              <a:spcAft>
-                <a:spcPts val="200"/>
-              </a:spcAft>
-              <a:buFont typeface="Franklin Gothic Book" panose="020B0503020102020204" pitchFamily="34" charset="0"/>
-              <a:buChar char="–"/>
-              <a:defRPr sz="1400" i="1" kern="1200" baseline="0">
-                <a:solidFill>
-                  <a:schemeClr val="tx2"/>
-                </a:solidFill>
-                <a:latin typeface="+mn-lt"/>
-                <a:ea typeface="+mn-ea"/>
-                <a:cs typeface="+mn-cs"/>
-              </a:defRPr>
-            </a:lvl8pPr>
-            <a:lvl9pPr marL="4114800" indent="-384048" algn="l" defTabSz="914400" rtl="0" eaLnBrk="1" latinLnBrk="0" hangingPunct="1">
-              <a:lnSpc>
-                <a:spcPct val="94000"/>
-              </a:lnSpc>
-              <a:spcBef>
-                <a:spcPts val="500"/>
-              </a:spcBef>
-              <a:spcAft>
-                <a:spcPts val="200"/>
-              </a:spcAft>
-              <a:buFont typeface="Franklin Gothic Book" panose="020B0503020102020204" pitchFamily="34" charset="0"/>
-              <a:buChar char="■"/>
-              <a:defRPr sz="1400" kern="1200" baseline="0">
-                <a:solidFill>
-                  <a:schemeClr val="tx2"/>
-                </a:solidFill>
-                <a:latin typeface="+mn-lt"/>
-                <a:ea typeface="+mn-ea"/>
-                <a:cs typeface="+mn-cs"/>
-              </a:defRPr>
-            </a:lvl9pPr>
-          </a:lstStyle>
-          <a:p>
-            <a:r>
-              <a:rPr lang="en-US" dirty="0" smtClean="0"/>
-              <a:t>Deployment</a:t>
-            </a:r>
-          </a:p>
-          <a:p>
-            <a:pPr lvl="1"/>
-            <a:r>
-              <a:rPr lang="en-US" dirty="0" smtClean="0"/>
-              <a:t>Prototype </a:t>
-            </a:r>
-            <a:r>
-              <a:rPr lang="mr-IN" dirty="0" smtClean="0"/>
-              <a:t>–</a:t>
-            </a:r>
-            <a:r>
-              <a:rPr lang="en-US" dirty="0" smtClean="0"/>
-              <a:t> Beta Testing</a:t>
-            </a:r>
-            <a:endParaRPr lang="en-US" dirty="0"/>
-          </a:p>
-          <a:p>
-            <a:pPr lvl="1"/>
-            <a:r>
-              <a:rPr lang="en-US" dirty="0"/>
-              <a:t>RCT (Rapid Cycle Testing)</a:t>
-            </a:r>
-          </a:p>
-          <a:p>
-            <a:r>
-              <a:rPr lang="en-US" dirty="0" smtClean="0"/>
-              <a:t>Release</a:t>
-            </a:r>
-          </a:p>
-          <a:p>
-            <a:pPr lvl="1"/>
-            <a:r>
-              <a:rPr lang="en-US" dirty="0" smtClean="0"/>
-              <a:t>Making it available to everyone</a:t>
-            </a:r>
-            <a:endParaRPr lang="en-US" dirty="0"/>
-          </a:p>
-          <a:p>
             <a:endParaRPr lang="en-US" dirty="0" smtClean="0"/>
+          </a:p>
+          <a:p>
+            <a:r>
+              <a:rPr lang="en-US" dirty="0" smtClean="0"/>
+              <a:t>View deck in reverse</a:t>
+            </a:r>
+          </a:p>
+          <a:p>
+            <a:endParaRPr lang="en-US" dirty="0" smtClean="0"/>
+          </a:p>
+          <a:p>
+            <a:r>
+              <a:rPr lang="en-US" dirty="0" smtClean="0"/>
+              <a:t>Dismiss cards</a:t>
+            </a:r>
           </a:p>
         </p:txBody>
       </p:sp>
     </p:spTree>
     <p:extLst>
       <p:ext uri="{BB962C8B-B14F-4D97-AF65-F5344CB8AC3E}">
-        <p14:creationId xmlns="" xmlns:p14="http://schemas.microsoft.com/office/powerpoint/2010/main" val="1788068256"/>
+        <p14:creationId xmlns:p14="http://schemas.microsoft.com/office/powerpoint/2010/main" val="1079179021"/>
       </p:ext>
     </p:extLst>
   </p:cSld>
@@ -6215,25 +5134,10 @@
           <a:lstStyle/>
           <a:p>
             <a:r>
-              <a:rPr lang="en-US" dirty="0"/>
-              <a:t>T</a:t>
-            </a:r>
-            <a:r>
-              <a:rPr lang="en-US" dirty="0" smtClean="0"/>
-              <a:t>echnologies Used </a:t>
-            </a:r>
-            <a:r>
-              <a:rPr lang="en-US" dirty="0"/>
-              <a:t>(and </a:t>
-            </a:r>
-            <a:r>
-              <a:rPr lang="en-US" dirty="0" smtClean="0"/>
-              <a:t>how </a:t>
-            </a:r>
-            <a:r>
-              <a:rPr lang="en-US" dirty="0"/>
-              <a:t>they work)</a:t>
-            </a:r>
+              <a:rPr lang="en-US" dirty="0" smtClean="0"/>
+              <a:t>Marketing Plan</a:t>
+            </a:r>
+            <a:endParaRPr lang="en-US" dirty="0"/>
           </a:p>
         </p:txBody>
       </p:sp>
@@ -6249,191 +5153,62 @@
         </p:nvSpPr>
         <p:spPr/>
         <p:txBody>
-          <a:bodyPr>
-            <a:normAutofit fontScale="70000" lnSpcReduction="20000"/>
+          <a:bodyPr numCol="2">
+            <a:normAutofit/>
           </a:bodyPr>
           <a:lstStyle/>
           <a:p>
             <a:r>
               <a:rPr lang="en-US" dirty="0" smtClean="0"/>
-              <a:t>Wikipedia API </a:t>
-            </a:r>
-            <a:r>
-              <a:rPr lang="mr-IN" dirty="0" smtClean="0"/>
-              <a:t>–</a:t>
-            </a:r>
-            <a:r>
-              <a:rPr lang="en-US" dirty="0" smtClean="0"/>
-              <a:t> List top 3 relevant information to display for user to reference.</a:t>
-            </a:r>
-          </a:p>
-          <a:p>
-            <a:r>
-              <a:rPr lang="en-US" dirty="0" smtClean="0"/>
-              <a:t>JQuery Flip Plugin </a:t>
-            </a:r>
-            <a:r>
-              <a:rPr lang="mr-IN" dirty="0" smtClean="0"/>
-              <a:t>–</a:t>
-            </a:r>
-            <a:r>
-              <a:rPr lang="en-US" dirty="0" smtClean="0"/>
-              <a:t> Provide user experience to mimic flashcards.</a:t>
-            </a:r>
-          </a:p>
-          <a:p>
-            <a:r>
-              <a:rPr lang="en-US" dirty="0" smtClean="0"/>
-              <a:t>Google Sign-In via Firebase </a:t>
-            </a:r>
-            <a:r>
-              <a:rPr lang="mr-IN" dirty="0" smtClean="0"/>
-              <a:t>–</a:t>
-            </a:r>
-            <a:r>
-              <a:rPr lang="en-US" dirty="0" smtClean="0"/>
-              <a:t> Provide easier option for user to log-in.</a:t>
-            </a:r>
-          </a:p>
-          <a:p>
-            <a:r>
-              <a:rPr lang="en-US" dirty="0" err="1" smtClean="0"/>
-              <a:t>Giphy</a:t>
-            </a:r>
-            <a:r>
-              <a:rPr lang="en-US" dirty="0" smtClean="0"/>
-              <a:t> API </a:t>
-            </a:r>
-            <a:r>
-              <a:rPr lang="mr-IN" dirty="0" smtClean="0"/>
-              <a:t>–</a:t>
-            </a:r>
-            <a:r>
-              <a:rPr lang="en-US" dirty="0" smtClean="0"/>
-              <a:t> Provide fun and encouraging animated images for user.</a:t>
-            </a:r>
-          </a:p>
-          <a:p>
-            <a:r>
-              <a:rPr lang="en-US" dirty="0" smtClean="0"/>
-              <a:t>Firebase </a:t>
-            </a:r>
-            <a:r>
-              <a:rPr lang="mr-IN" dirty="0" smtClean="0"/>
-              <a:t>–</a:t>
-            </a:r>
-            <a:r>
-              <a:rPr lang="en-US" dirty="0" smtClean="0"/>
-              <a:t> House data.</a:t>
-            </a:r>
-          </a:p>
-          <a:p>
-            <a:r>
-              <a:rPr lang="en-US" dirty="0" err="1" smtClean="0"/>
-              <a:t>Draw.io</a:t>
-            </a:r>
-            <a:r>
-              <a:rPr lang="en-US" dirty="0" smtClean="0"/>
-              <a:t> </a:t>
-            </a:r>
-            <a:r>
-              <a:rPr lang="mr-IN" dirty="0" smtClean="0"/>
-              <a:t>–</a:t>
-            </a:r>
-            <a:r>
-              <a:rPr lang="en-US" dirty="0" smtClean="0"/>
-              <a:t> Online system to allow to draw out a wireframe.</a:t>
-            </a:r>
-          </a:p>
-          <a:p>
-            <a:r>
-              <a:rPr lang="en-US" dirty="0" err="1" smtClean="0"/>
-              <a:t>Pnotify</a:t>
-            </a:r>
-            <a:r>
-              <a:rPr lang="en-US" dirty="0" smtClean="0"/>
-              <a:t> </a:t>
-            </a:r>
-            <a:r>
-              <a:rPr lang="mr-IN" dirty="0" smtClean="0"/>
-              <a:t>–</a:t>
-            </a:r>
-            <a:r>
-              <a:rPr lang="en-US" dirty="0" smtClean="0"/>
-              <a:t> Notification system.</a:t>
-            </a:r>
-          </a:p>
-          <a:p>
-            <a:r>
-              <a:rPr lang="en-US" dirty="0" err="1" smtClean="0"/>
-              <a:t>Pixlr</a:t>
-            </a:r>
-            <a:r>
-              <a:rPr lang="en-US" dirty="0" smtClean="0"/>
-              <a:t> Editor </a:t>
-            </a:r>
-            <a:r>
-              <a:rPr lang="mr-IN" dirty="0" smtClean="0"/>
-              <a:t>–</a:t>
-            </a:r>
-            <a:r>
-              <a:rPr lang="en-US" dirty="0" smtClean="0"/>
-              <a:t> Create logo.</a:t>
-            </a:r>
-          </a:p>
-          <a:p>
-            <a:r>
-              <a:rPr lang="en-US" dirty="0" smtClean="0"/>
-              <a:t>Trello </a:t>
-            </a:r>
-            <a:r>
-              <a:rPr lang="mr-IN" dirty="0" smtClean="0"/>
-              <a:t>–</a:t>
-            </a:r>
-            <a:r>
-              <a:rPr lang="en-US" dirty="0" smtClean="0"/>
-              <a:t> Lay out and assigning tasks.</a:t>
-            </a:r>
-          </a:p>
-          <a:p>
-            <a:r>
-              <a:rPr lang="en-US" dirty="0" err="1" smtClean="0"/>
-              <a:t>GitKraken</a:t>
-            </a:r>
-            <a:r>
-              <a:rPr lang="en-US" dirty="0" smtClean="0"/>
-              <a:t> </a:t>
-            </a:r>
-            <a:r>
-              <a:rPr lang="mr-IN" dirty="0" smtClean="0"/>
-              <a:t>–</a:t>
-            </a:r>
-            <a:r>
-              <a:rPr lang="en-US" dirty="0" smtClean="0"/>
-              <a:t> GUI (Graphical User Interface) version control interface.</a:t>
-            </a:r>
-          </a:p>
-          <a:p>
-            <a:r>
-              <a:rPr lang="en-US" dirty="0" smtClean="0"/>
-              <a:t>GitHub - </a:t>
-            </a:r>
-            <a:r>
-              <a:rPr lang="en-US" dirty="0"/>
-              <a:t>V</a:t>
-            </a:r>
-            <a:r>
-              <a:rPr lang="en-US" dirty="0" smtClean="0"/>
-              <a:t>ersion </a:t>
-            </a:r>
-            <a:r>
-              <a:rPr lang="en-US" dirty="0"/>
-              <a:t>control and source code </a:t>
-            </a:r>
-            <a:r>
-              <a:rPr lang="en-US" dirty="0" smtClean="0"/>
-              <a:t>management system.</a:t>
-            </a:r>
+              <a:t>Word-of-Mouth </a:t>
+            </a:r>
+            <a:r>
+              <a:rPr lang="en-US" dirty="0" smtClean="0"/>
+              <a:t>Marketing</a:t>
+            </a:r>
+          </a:p>
+          <a:p>
+            <a:endParaRPr lang="en-US" dirty="0" smtClean="0"/>
+          </a:p>
+          <a:p>
+            <a:r>
+              <a:rPr lang="en-US" dirty="0" smtClean="0"/>
+              <a:t>Social </a:t>
+            </a:r>
+            <a:r>
+              <a:rPr lang="en-US" dirty="0" smtClean="0"/>
+              <a:t>Media</a:t>
+            </a:r>
+          </a:p>
+          <a:p>
+            <a:endParaRPr lang="en-US" dirty="0" smtClean="0"/>
+          </a:p>
+          <a:p>
+            <a:r>
+              <a:rPr lang="en-US" dirty="0" smtClean="0"/>
+              <a:t>SEO</a:t>
+            </a:r>
+          </a:p>
+          <a:p>
+            <a:endParaRPr lang="en-US" dirty="0" smtClean="0"/>
+          </a:p>
+          <a:p>
+            <a:r>
+              <a:rPr lang="en-US" dirty="0" smtClean="0"/>
+              <a:t>Partnerships </a:t>
+            </a:r>
+            <a:r>
+              <a:rPr lang="en-US" dirty="0" smtClean="0"/>
+              <a:t>with educational organizations</a:t>
+            </a:r>
+          </a:p>
+          <a:p>
+            <a:r>
+              <a:rPr lang="en-US" dirty="0" smtClean="0"/>
+              <a:t>AdSense</a:t>
+            </a:r>
+          </a:p>
+          <a:p>
             <a:endParaRPr lang="en-US" dirty="0"/>
           </a:p>
         </p:txBody>
@@ -6441,7 +5216,7 @@
     </p:spTree>
     <p:extLst>
       <p:ext uri="{BB962C8B-B14F-4D97-AF65-F5344CB8AC3E}">
-        <p14:creationId xmlns="" xmlns:p14="http://schemas.microsoft.com/office/powerpoint/2010/main" val="177022474"/>
+        <p14:creationId xmlns:p14="http://schemas.microsoft.com/office/powerpoint/2010/main" val="1040487182"/>
       </p:ext>
     </p:extLst>
   </p:cSld>
@@ -6710,7 +5485,7 @@
   <a:extraClrSchemeLst/>
   <a:extLst>
     <a:ext uri="{05A4C25C-085E-4340-85A3-A5531E510DB2}">
-      <thm15:themeFamily xmlns="" xmlns:thm15="http://schemas.microsoft.com/office/thememl/2012/main" name="Crop" id="{EC9488ED-E761-4D60-9AC4-764D1FE2C171}" vid="{CE19780C-D67D-4C13-9DE9-A52BC3BA51B4}"/>
+      <thm15:themeFamily xmlns:thm15="http://schemas.microsoft.com/office/thememl/2012/main" name="Crop" id="{EC9488ED-E761-4D60-9AC4-764D1FE2C171}" vid="{CE19780C-D67D-4C13-9DE9-A52BC3BA51B4}"/>
     </a:ext>
   </a:extLst>
 </a:theme>

</xml_diff>

<commit_message>
Add logo to Powerpoint
</commit_message>
<xml_diff>
--- a/powerpoint/codeDeck2.pptx
+++ b/powerpoint/codeDeck2.pptx
@@ -3841,7 +3841,12 @@
             <p:ph type="ctrTitle"/>
           </p:nvPr>
         </p:nvSpPr>
-        <p:spPr/>
+        <p:spPr>
+          <a:xfrm>
+            <a:off x="2768144" y="1858053"/>
+            <a:ext cx="8361229" cy="2098226"/>
+          </a:xfrm>
+        </p:spPr>
         <p:txBody>
           <a:bodyPr/>
           <a:lstStyle/>
@@ -3864,7 +3869,12 @@
             <p:ph type="subTitle" idx="1"/>
           </p:nvPr>
         </p:nvSpPr>
-        <p:spPr/>
+        <p:spPr>
+          <a:xfrm>
+            <a:off x="3621161" y="3864378"/>
+            <a:ext cx="6831673" cy="1086237"/>
+          </a:xfrm>
+        </p:spPr>
         <p:txBody>
           <a:bodyPr/>
           <a:lstStyle/>
@@ -3881,6 +3891,36 @@
           </a:p>
         </p:txBody>
       </p:sp>
+      <p:pic>
+        <p:nvPicPr>
+          <p:cNvPr id="4" name="Picture 3"/>
+          <p:cNvPicPr>
+            <a:picLocks noChangeAspect="1"/>
+          </p:cNvPicPr>
+          <p:nvPr/>
+        </p:nvPicPr>
+        <p:blipFill>
+          <a:blip r:embed="rId2">
+            <a:extLst>
+              <a:ext uri="{28A0092B-C50C-407E-A947-70E740481C1C}">
+                <a14:useLocalDpi xmlns:a14="http://schemas.microsoft.com/office/drawing/2010/main" val="0"/>
+              </a:ext>
+            </a:extLst>
+          </a:blip>
+          <a:stretch>
+            <a:fillRect/>
+          </a:stretch>
+        </p:blipFill>
+        <p:spPr>
+          <a:xfrm>
+            <a:off x="2643261" y="2792114"/>
+            <a:ext cx="1706033" cy="1661333"/>
+          </a:xfrm>
+          <a:prstGeom prst="rect">
+            <a:avLst/>
+          </a:prstGeom>
+        </p:spPr>
+      </p:pic>
     </p:spTree>
     <p:extLst>
       <p:ext uri="{BB962C8B-B14F-4D97-AF65-F5344CB8AC3E}">
@@ -4062,6 +4102,36 @@
           </a:p>
         </p:txBody>
       </p:sp>
+      <p:pic>
+        <p:nvPicPr>
+          <p:cNvPr id="4" name="Picture 3"/>
+          <p:cNvPicPr>
+            <a:picLocks noChangeAspect="1"/>
+          </p:cNvPicPr>
+          <p:nvPr/>
+        </p:nvPicPr>
+        <p:blipFill>
+          <a:blip r:embed="rId2">
+            <a:extLst>
+              <a:ext uri="{28A0092B-C50C-407E-A947-70E740481C1C}">
+                <a14:useLocalDpi xmlns:a14="http://schemas.microsoft.com/office/drawing/2010/main" val="0"/>
+              </a:ext>
+            </a:extLst>
+          </a:blip>
+          <a:stretch>
+            <a:fillRect/>
+          </a:stretch>
+        </p:blipFill>
+        <p:spPr>
+          <a:xfrm>
+            <a:off x="10799783" y="312003"/>
+            <a:ext cx="1146794" cy="1116747"/>
+          </a:xfrm>
+          <a:prstGeom prst="rect">
+            <a:avLst/>
+          </a:prstGeom>
+        </p:spPr>
+      </p:pic>
     </p:spTree>
     <p:extLst>
       <p:ext uri="{BB962C8B-B14F-4D97-AF65-F5344CB8AC3E}">
@@ -4176,6 +4246,36 @@
           </a:p>
         </p:txBody>
       </p:sp>
+      <p:pic>
+        <p:nvPicPr>
+          <p:cNvPr id="4" name="Picture 3"/>
+          <p:cNvPicPr>
+            <a:picLocks noChangeAspect="1"/>
+          </p:cNvPicPr>
+          <p:nvPr/>
+        </p:nvPicPr>
+        <p:blipFill>
+          <a:blip r:embed="rId2">
+            <a:extLst>
+              <a:ext uri="{28A0092B-C50C-407E-A947-70E740481C1C}">
+                <a14:useLocalDpi xmlns:a14="http://schemas.microsoft.com/office/drawing/2010/main" val="0"/>
+              </a:ext>
+            </a:extLst>
+          </a:blip>
+          <a:stretch>
+            <a:fillRect/>
+          </a:stretch>
+        </p:blipFill>
+        <p:spPr>
+          <a:xfrm>
+            <a:off x="10799783" y="312003"/>
+            <a:ext cx="1146794" cy="1116747"/>
+          </a:xfrm>
+          <a:prstGeom prst="rect">
+            <a:avLst/>
+          </a:prstGeom>
+        </p:spPr>
+      </p:pic>
     </p:spTree>
     <p:extLst>
       <p:ext uri="{BB962C8B-B14F-4D97-AF65-F5344CB8AC3E}">
@@ -4341,6 +4441,36 @@
           </a:p>
         </p:txBody>
       </p:sp>
+      <p:pic>
+        <p:nvPicPr>
+          <p:cNvPr id="6" name="Picture 5"/>
+          <p:cNvPicPr>
+            <a:picLocks noChangeAspect="1"/>
+          </p:cNvPicPr>
+          <p:nvPr/>
+        </p:nvPicPr>
+        <p:blipFill>
+          <a:blip r:embed="rId2">
+            <a:extLst>
+              <a:ext uri="{28A0092B-C50C-407E-A947-70E740481C1C}">
+                <a14:useLocalDpi xmlns:a14="http://schemas.microsoft.com/office/drawing/2010/main" val="0"/>
+              </a:ext>
+            </a:extLst>
+          </a:blip>
+          <a:stretch>
+            <a:fillRect/>
+          </a:stretch>
+        </p:blipFill>
+        <p:spPr>
+          <a:xfrm>
+            <a:off x="10799783" y="312003"/>
+            <a:ext cx="1146794" cy="1116747"/>
+          </a:xfrm>
+          <a:prstGeom prst="rect">
+            <a:avLst/>
+          </a:prstGeom>
+        </p:spPr>
+      </p:pic>
     </p:spTree>
     <p:extLst>
       <p:ext uri="{BB962C8B-B14F-4D97-AF65-F5344CB8AC3E}">
@@ -4460,6 +4590,36 @@
           </a:p>
         </p:txBody>
       </p:sp>
+      <p:pic>
+        <p:nvPicPr>
+          <p:cNvPr id="4" name="Picture 3"/>
+          <p:cNvPicPr>
+            <a:picLocks noChangeAspect="1"/>
+          </p:cNvPicPr>
+          <p:nvPr/>
+        </p:nvPicPr>
+        <p:blipFill>
+          <a:blip r:embed="rId2">
+            <a:extLst>
+              <a:ext uri="{28A0092B-C50C-407E-A947-70E740481C1C}">
+                <a14:useLocalDpi xmlns:a14="http://schemas.microsoft.com/office/drawing/2010/main" val="0"/>
+              </a:ext>
+            </a:extLst>
+          </a:blip>
+          <a:stretch>
+            <a:fillRect/>
+          </a:stretch>
+        </p:blipFill>
+        <p:spPr>
+          <a:xfrm>
+            <a:off x="10799783" y="312003"/>
+            <a:ext cx="1146794" cy="1116747"/>
+          </a:xfrm>
+          <a:prstGeom prst="rect">
+            <a:avLst/>
+          </a:prstGeom>
+        </p:spPr>
+      </p:pic>
     </p:spTree>
     <p:extLst>
       <p:ext uri="{BB962C8B-B14F-4D97-AF65-F5344CB8AC3E}">
@@ -4569,6 +4729,36 @@
           </a:p>
         </p:txBody>
       </p:sp>
+      <p:pic>
+        <p:nvPicPr>
+          <p:cNvPr id="4" name="Picture 3"/>
+          <p:cNvPicPr>
+            <a:picLocks noChangeAspect="1"/>
+          </p:cNvPicPr>
+          <p:nvPr/>
+        </p:nvPicPr>
+        <p:blipFill>
+          <a:blip r:embed="rId2">
+            <a:extLst>
+              <a:ext uri="{28A0092B-C50C-407E-A947-70E740481C1C}">
+                <a14:useLocalDpi xmlns:a14="http://schemas.microsoft.com/office/drawing/2010/main" val="0"/>
+              </a:ext>
+            </a:extLst>
+          </a:blip>
+          <a:stretch>
+            <a:fillRect/>
+          </a:stretch>
+        </p:blipFill>
+        <p:spPr>
+          <a:xfrm>
+            <a:off x="10799783" y="312003"/>
+            <a:ext cx="1146794" cy="1116747"/>
+          </a:xfrm>
+          <a:prstGeom prst="rect">
+            <a:avLst/>
+          </a:prstGeom>
+        </p:spPr>
+      </p:pic>
     </p:spTree>
     <p:extLst>
       <p:ext uri="{BB962C8B-B14F-4D97-AF65-F5344CB8AC3E}">
@@ -4696,6 +4886,36 @@
           </a:p>
         </p:txBody>
       </p:sp>
+      <p:pic>
+        <p:nvPicPr>
+          <p:cNvPr id="6" name="Picture 5"/>
+          <p:cNvPicPr>
+            <a:picLocks noChangeAspect="1"/>
+          </p:cNvPicPr>
+          <p:nvPr/>
+        </p:nvPicPr>
+        <p:blipFill>
+          <a:blip r:embed="rId2">
+            <a:extLst>
+              <a:ext uri="{28A0092B-C50C-407E-A947-70E740481C1C}">
+                <a14:useLocalDpi xmlns:a14="http://schemas.microsoft.com/office/drawing/2010/main" val="0"/>
+              </a:ext>
+            </a:extLst>
+          </a:blip>
+          <a:stretch>
+            <a:fillRect/>
+          </a:stretch>
+        </p:blipFill>
+        <p:spPr>
+          <a:xfrm>
+            <a:off x="10799783" y="312003"/>
+            <a:ext cx="1146794" cy="1116747"/>
+          </a:xfrm>
+          <a:prstGeom prst="rect">
+            <a:avLst/>
+          </a:prstGeom>
+        </p:spPr>
+      </p:pic>
     </p:spTree>
     <p:extLst>
       <p:ext uri="{BB962C8B-B14F-4D97-AF65-F5344CB8AC3E}">
@@ -4879,6 +5099,36 @@
           </a:p>
         </p:txBody>
       </p:sp>
+      <p:pic>
+        <p:nvPicPr>
+          <p:cNvPr id="4" name="Picture 3"/>
+          <p:cNvPicPr>
+            <a:picLocks noChangeAspect="1"/>
+          </p:cNvPicPr>
+          <p:nvPr/>
+        </p:nvPicPr>
+        <p:blipFill>
+          <a:blip r:embed="rId2">
+            <a:extLst>
+              <a:ext uri="{28A0092B-C50C-407E-A947-70E740481C1C}">
+                <a14:useLocalDpi xmlns:a14="http://schemas.microsoft.com/office/drawing/2010/main" val="0"/>
+              </a:ext>
+            </a:extLst>
+          </a:blip>
+          <a:stretch>
+            <a:fillRect/>
+          </a:stretch>
+        </p:blipFill>
+        <p:spPr>
+          <a:xfrm>
+            <a:off x="10799783" y="312003"/>
+            <a:ext cx="1146794" cy="1116747"/>
+          </a:xfrm>
+          <a:prstGeom prst="rect">
+            <a:avLst/>
+          </a:prstGeom>
+        </p:spPr>
+      </p:pic>
     </p:spTree>
     <p:extLst>
       <p:ext uri="{BB962C8B-B14F-4D97-AF65-F5344CB8AC3E}">
@@ -4967,6 +5217,36 @@
           </a:p>
         </p:txBody>
       </p:sp>
+      <p:pic>
+        <p:nvPicPr>
+          <p:cNvPr id="4" name="Picture 3"/>
+          <p:cNvPicPr>
+            <a:picLocks noChangeAspect="1"/>
+          </p:cNvPicPr>
+          <p:nvPr/>
+        </p:nvPicPr>
+        <p:blipFill>
+          <a:blip r:embed="rId3">
+            <a:extLst>
+              <a:ext uri="{28A0092B-C50C-407E-A947-70E740481C1C}">
+                <a14:useLocalDpi xmlns:a14="http://schemas.microsoft.com/office/drawing/2010/main" val="0"/>
+              </a:ext>
+            </a:extLst>
+          </a:blip>
+          <a:stretch>
+            <a:fillRect/>
+          </a:stretch>
+        </p:blipFill>
+        <p:spPr>
+          <a:xfrm>
+            <a:off x="10799783" y="312003"/>
+            <a:ext cx="1146794" cy="1116747"/>
+          </a:xfrm>
+          <a:prstGeom prst="rect">
+            <a:avLst/>
+          </a:prstGeom>
+        </p:spPr>
+      </p:pic>
     </p:spTree>
     <p:extLst>
       <p:ext uri="{BB962C8B-B14F-4D97-AF65-F5344CB8AC3E}">
@@ -5048,13 +5328,14 @@
           <a:p>
             <a:r>
               <a:rPr lang="en-US" dirty="0" smtClean="0"/>
-              <a:t>Additional Decks</a:t>
-            </a:r>
-          </a:p>
-          <a:p>
+              <a:t>Additional decks</a:t>
+            </a:r>
             <a:endParaRPr lang="en-US" dirty="0" smtClean="0"/>
           </a:p>
           <a:p>
+            <a:endParaRPr lang="en-US" dirty="0" smtClean="0"/>
+          </a:p>
+          <a:p>
             <a:r>
               <a:rPr lang="en-US" dirty="0" smtClean="0"/>
               <a:t>Quiz</a:t>
@@ -5081,6 +5362,36 @@
           </a:p>
         </p:txBody>
       </p:sp>
+      <p:pic>
+        <p:nvPicPr>
+          <p:cNvPr id="4" name="Picture 3"/>
+          <p:cNvPicPr>
+            <a:picLocks noChangeAspect="1"/>
+          </p:cNvPicPr>
+          <p:nvPr/>
+        </p:nvPicPr>
+        <p:blipFill>
+          <a:blip r:embed="rId2">
+            <a:extLst>
+              <a:ext uri="{28A0092B-C50C-407E-A947-70E740481C1C}">
+                <a14:useLocalDpi xmlns:a14="http://schemas.microsoft.com/office/drawing/2010/main" val="0"/>
+              </a:ext>
+            </a:extLst>
+          </a:blip>
+          <a:stretch>
+            <a:fillRect/>
+          </a:stretch>
+        </p:blipFill>
+        <p:spPr>
+          <a:xfrm>
+            <a:off x="10799783" y="312003"/>
+            <a:ext cx="1146794" cy="1116747"/>
+          </a:xfrm>
+          <a:prstGeom prst="rect">
+            <a:avLst/>
+          </a:prstGeom>
+        </p:spPr>
+      </p:pic>
     </p:spTree>
     <p:extLst>
       <p:ext uri="{BB962C8B-B14F-4D97-AF65-F5344CB8AC3E}">
@@ -5164,7 +5475,11 @@
             </a:r>
             <a:r>
               <a:rPr lang="en-US" dirty="0" smtClean="0"/>
-              <a:t>Marketing</a:t>
+              <a:t>m</a:t>
+            </a:r>
+            <a:r>
+              <a:rPr lang="en-US" dirty="0" smtClean="0"/>
+              <a:t>arketing</a:t>
             </a:r>
           </a:p>
           <a:p>
@@ -5173,11 +5488,7 @@
           <a:p>
             <a:r>
               <a:rPr lang="en-US" dirty="0" smtClean="0"/>
-              <a:t>Social </a:t>
-            </a:r>
-            <a:r>
-              <a:rPr lang="en-US" dirty="0" smtClean="0"/>
-              <a:t>Media</a:t>
+              <a:t>Social media</a:t>
             </a:r>
           </a:p>
           <a:p>
@@ -5213,6 +5524,36 @@
           </a:p>
         </p:txBody>
       </p:sp>
+      <p:pic>
+        <p:nvPicPr>
+          <p:cNvPr id="4" name="Picture 3"/>
+          <p:cNvPicPr>
+            <a:picLocks noChangeAspect="1"/>
+          </p:cNvPicPr>
+          <p:nvPr/>
+        </p:nvPicPr>
+        <p:blipFill>
+          <a:blip r:embed="rId2">
+            <a:extLst>
+              <a:ext uri="{28A0092B-C50C-407E-A947-70E740481C1C}">
+                <a14:useLocalDpi xmlns:a14="http://schemas.microsoft.com/office/drawing/2010/main" val="0"/>
+              </a:ext>
+            </a:extLst>
+          </a:blip>
+          <a:stretch>
+            <a:fillRect/>
+          </a:stretch>
+        </p:blipFill>
+        <p:spPr>
+          <a:xfrm>
+            <a:off x="10799783" y="312003"/>
+            <a:ext cx="1146794" cy="1116747"/>
+          </a:xfrm>
+          <a:prstGeom prst="rect">
+            <a:avLst/>
+          </a:prstGeom>
+        </p:spPr>
+      </p:pic>
     </p:spTree>
     <p:extLst>
       <p:ext uri="{BB962C8B-B14F-4D97-AF65-F5344CB8AC3E}">

</xml_diff>

<commit_message>
Revert "Merge branch 'julie' into dev"
This reverts commit d288ff895545e00565a8d71a0d48749ff3c2278a.
</commit_message>
<xml_diff>
--- a/powerpoint/codeDeck2.pptx
+++ b/powerpoint/codeDeck2.pptx
@@ -6,17 +6,16 @@
   </p:sldMasterIdLst>
   <p:sldIdLst>
     <p:sldId id="256" r:id="rId2"/>
-    <p:sldId id="268" r:id="rId3"/>
-    <p:sldId id="266" r:id="rId4"/>
-    <p:sldId id="257" r:id="rId5"/>
-    <p:sldId id="259" r:id="rId6"/>
-    <p:sldId id="267" r:id="rId7"/>
-    <p:sldId id="261" r:id="rId8"/>
-    <p:sldId id="262" r:id="rId9"/>
-    <p:sldId id="263" r:id="rId10"/>
-    <p:sldId id="258" r:id="rId11"/>
-    <p:sldId id="265" r:id="rId12"/>
-    <p:sldId id="264" r:id="rId13"/>
+    <p:sldId id="266" r:id="rId3"/>
+    <p:sldId id="257" r:id="rId4"/>
+    <p:sldId id="259" r:id="rId5"/>
+    <p:sldId id="267" r:id="rId6"/>
+    <p:sldId id="261" r:id="rId7"/>
+    <p:sldId id="262" r:id="rId8"/>
+    <p:sldId id="263" r:id="rId9"/>
+    <p:sldId id="258" r:id="rId10"/>
+    <p:sldId id="265" r:id="rId11"/>
+    <p:sldId id="264" r:id="rId12"/>
   </p:sldIdLst>
   <p:sldSz cx="12192000" cy="6858000"/>
   <p:notesSz cx="6858000" cy="9144000"/>
@@ -296,7 +295,7 @@
             <a:fld id="{87DE6118-2437-4B30-8E3C-4D2BE6020583}" type="datetimeFigureOut">
               <a:rPr lang="en-US" dirty="0"/>
               <a:pPr/>
-              <a:t>9/8/17</a:t>
+              <a:t>9/7/17</a:t>
             </a:fld>
             <a:endParaRPr lang="en-US" dirty="0"/>
           </a:p>
@@ -626,7 +625,7 @@
             <a:fld id="{87DE6118-2437-4B30-8E3C-4D2BE6020583}" type="datetimeFigureOut">
               <a:rPr lang="en-US" dirty="0"/>
               <a:pPr/>
-              <a:t>9/8/17</a:t>
+              <a:t>9/7/17</a:t>
             </a:fld>
             <a:endParaRPr lang="en-US" dirty="0"/>
           </a:p>
@@ -806,7 +805,7 @@
             <a:fld id="{87DE6118-2437-4B30-8E3C-4D2BE6020583}" type="datetimeFigureOut">
               <a:rPr lang="en-US" dirty="0"/>
               <a:pPr/>
-              <a:t>9/8/17</a:t>
+              <a:t>9/7/17</a:t>
             </a:fld>
             <a:endParaRPr lang="en-US" dirty="0"/>
           </a:p>
@@ -976,7 +975,7 @@
             <a:fld id="{87DE6118-2437-4B30-8E3C-4D2BE6020583}" type="datetimeFigureOut">
               <a:rPr lang="en-US" dirty="0"/>
               <a:pPr/>
-              <a:t>9/8/17</a:t>
+              <a:t>9/7/17</a:t>
             </a:fld>
             <a:endParaRPr lang="en-US" dirty="0"/>
           </a:p>
@@ -1248,7 +1247,7 @@
             <a:fld id="{87DE6118-2437-4B30-8E3C-4D2BE6020583}" type="datetimeFigureOut">
               <a:rPr lang="en-US" dirty="0"/>
               <a:pPr/>
-              <a:t>9/8/17</a:t>
+              <a:t>9/7/17</a:t>
             </a:fld>
             <a:endParaRPr lang="en-US" dirty="0"/>
           </a:p>
@@ -1642,7 +1641,7 @@
             <a:fld id="{87DE6118-2437-4B30-8E3C-4D2BE6020583}" type="datetimeFigureOut">
               <a:rPr lang="en-US" dirty="0"/>
               <a:pPr/>
-              <a:t>9/8/17</a:t>
+              <a:t>9/7/17</a:t>
             </a:fld>
             <a:endParaRPr lang="en-US" dirty="0"/>
           </a:p>
@@ -2119,7 +2118,7 @@
             <a:fld id="{87DE6118-2437-4B30-8E3C-4D2BE6020583}" type="datetimeFigureOut">
               <a:rPr lang="en-US" dirty="0"/>
               <a:pPr/>
-              <a:t>9/8/17</a:t>
+              <a:t>9/7/17</a:t>
             </a:fld>
             <a:endParaRPr lang="en-US" dirty="0"/>
           </a:p>
@@ -2237,7 +2236,7 @@
             <a:fld id="{87DE6118-2437-4B30-8E3C-4D2BE6020583}" type="datetimeFigureOut">
               <a:rPr lang="en-US" dirty="0"/>
               <a:pPr/>
-              <a:t>9/8/17</a:t>
+              <a:t>9/7/17</a:t>
             </a:fld>
             <a:endParaRPr lang="en-US" dirty="0"/>
           </a:p>
@@ -2332,7 +2331,7 @@
             <a:fld id="{87DE6118-2437-4B30-8E3C-4D2BE6020583}" type="datetimeFigureOut">
               <a:rPr lang="en-US" dirty="0"/>
               <a:pPr/>
-              <a:t>9/8/17</a:t>
+              <a:t>9/7/17</a:t>
             </a:fld>
             <a:endParaRPr lang="en-US" dirty="0"/>
           </a:p>
@@ -2678,7 +2677,7 @@
             <a:fld id="{87DE6118-2437-4B30-8E3C-4D2BE6020583}" type="datetimeFigureOut">
               <a:rPr lang="en-US" dirty="0"/>
               <a:pPr/>
-              <a:t>9/8/17</a:t>
+              <a:t>9/7/17</a:t>
             </a:fld>
             <a:endParaRPr lang="en-US" dirty="0"/>
           </a:p>
@@ -3066,7 +3065,7 @@
             <a:fld id="{87DE6118-2437-4B30-8E3C-4D2BE6020583}" type="datetimeFigureOut">
               <a:rPr lang="en-US" dirty="0"/>
               <a:pPr/>
-              <a:t>9/8/17</a:t>
+              <a:t>9/7/17</a:t>
             </a:fld>
             <a:endParaRPr lang="en-US" dirty="0"/>
           </a:p>
@@ -3341,7 +3340,7 @@
             <a:fld id="{87DE6118-2437-4B30-8E3C-4D2BE6020583}" type="datetimeFigureOut">
               <a:rPr lang="en-US" dirty="0"/>
               <a:pPr/>
-              <a:t>9/8/17</a:t>
+              <a:t>9/7/17</a:t>
             </a:fld>
             <a:endParaRPr lang="en-US" dirty="0"/>
           </a:p>
@@ -3942,227 +3941,6 @@
           </a:prstGeom>
         </p:spPr>
       </p:pic>
-      <p:sp>
-        <p:nvSpPr>
-          <p:cNvPr id="5" name="Subtitle 2"/>
-          <p:cNvSpPr txBox="1">
-            <a:spLocks/>
-          </p:cNvSpPr>
-          <p:nvPr/>
-        </p:nvSpPr>
-        <p:spPr>
-          <a:xfrm>
-            <a:off x="3621161" y="4325163"/>
-            <a:ext cx="6831673" cy="1086237"/>
-          </a:xfrm>
-          <a:prstGeom prst="rect">
-            <a:avLst/>
-          </a:prstGeom>
-        </p:spPr>
-        <p:txBody>
-          <a:bodyPr vert="horz" lIns="91440" tIns="45720" rIns="91440" bIns="45720" rtlCol="0">
-            <a:normAutofit/>
-          </a:bodyPr>
-          <a:lstStyle>
-            <a:lvl1pPr marL="0" indent="0" algn="ctr" defTabSz="914400" rtl="0" eaLnBrk="1" latinLnBrk="0" hangingPunct="1">
-              <a:lnSpc>
-                <a:spcPct val="112000"/>
-              </a:lnSpc>
-              <a:spcBef>
-                <a:spcPts val="0"/>
-              </a:spcBef>
-              <a:spcAft>
-                <a:spcPts val="0"/>
-              </a:spcAft>
-              <a:buFont typeface="Franklin Gothic Book" panose="020B0503020102020204" pitchFamily="34" charset="0"/>
-              <a:buNone/>
-              <a:defRPr sz="2300" kern="1200" baseline="0">
-                <a:solidFill>
-                  <a:schemeClr val="tx2"/>
-                </a:solidFill>
-                <a:latin typeface="+mn-lt"/>
-                <a:ea typeface="+mn-ea"/>
-                <a:cs typeface="+mn-cs"/>
-              </a:defRPr>
-            </a:lvl1pPr>
-            <a:lvl2pPr marL="457200" indent="0" algn="ctr" defTabSz="914400" rtl="0" eaLnBrk="1" latinLnBrk="0" hangingPunct="1">
-              <a:lnSpc>
-                <a:spcPct val="94000"/>
-              </a:lnSpc>
-              <a:spcBef>
-                <a:spcPts val="500"/>
-              </a:spcBef>
-              <a:spcAft>
-                <a:spcPts val="200"/>
-              </a:spcAft>
-              <a:buFont typeface="Franklin Gothic Book" panose="020B0503020102020204" pitchFamily="34" charset="0"/>
-              <a:buNone/>
-              <a:defRPr sz="2000" i="1" kern="1200" baseline="0">
-                <a:solidFill>
-                  <a:schemeClr val="tx2"/>
-                </a:solidFill>
-                <a:latin typeface="+mn-lt"/>
-                <a:ea typeface="+mn-ea"/>
-                <a:cs typeface="+mn-cs"/>
-              </a:defRPr>
-            </a:lvl2pPr>
-            <a:lvl3pPr marL="914400" indent="0" algn="ctr" defTabSz="914400" rtl="0" eaLnBrk="1" latinLnBrk="0" hangingPunct="1">
-              <a:lnSpc>
-                <a:spcPct val="94000"/>
-              </a:lnSpc>
-              <a:spcBef>
-                <a:spcPts val="500"/>
-              </a:spcBef>
-              <a:spcAft>
-                <a:spcPts val="200"/>
-              </a:spcAft>
-              <a:buFont typeface="Franklin Gothic Book" panose="020B0503020102020204" pitchFamily="34" charset="0"/>
-              <a:buNone/>
-              <a:defRPr sz="1800" kern="1200" baseline="0">
-                <a:solidFill>
-                  <a:schemeClr val="tx2"/>
-                </a:solidFill>
-                <a:latin typeface="+mn-lt"/>
-                <a:ea typeface="+mn-ea"/>
-                <a:cs typeface="+mn-cs"/>
-              </a:defRPr>
-            </a:lvl3pPr>
-            <a:lvl4pPr marL="1371600" indent="0" algn="ctr" defTabSz="914400" rtl="0" eaLnBrk="1" latinLnBrk="0" hangingPunct="1">
-              <a:lnSpc>
-                <a:spcPct val="94000"/>
-              </a:lnSpc>
-              <a:spcBef>
-                <a:spcPts val="500"/>
-              </a:spcBef>
-              <a:spcAft>
-                <a:spcPts val="200"/>
-              </a:spcAft>
-              <a:buFont typeface="Franklin Gothic Book" panose="020B0503020102020204" pitchFamily="34" charset="0"/>
-              <a:buNone/>
-              <a:defRPr sz="1600" i="1" kern="1200" baseline="0">
-                <a:solidFill>
-                  <a:schemeClr val="tx2"/>
-                </a:solidFill>
-                <a:latin typeface="+mn-lt"/>
-                <a:ea typeface="+mn-ea"/>
-                <a:cs typeface="+mn-cs"/>
-              </a:defRPr>
-            </a:lvl4pPr>
-            <a:lvl5pPr marL="1828800" indent="0" algn="ctr" defTabSz="914400" rtl="0" eaLnBrk="1" latinLnBrk="0" hangingPunct="1">
-              <a:lnSpc>
-                <a:spcPct val="94000"/>
-              </a:lnSpc>
-              <a:spcBef>
-                <a:spcPts val="500"/>
-              </a:spcBef>
-              <a:spcAft>
-                <a:spcPts val="200"/>
-              </a:spcAft>
-              <a:buFont typeface="Franklin Gothic Book" panose="020B0503020102020204" pitchFamily="34" charset="0"/>
-              <a:buNone/>
-              <a:defRPr sz="1600" kern="1200" baseline="0">
-                <a:solidFill>
-                  <a:schemeClr val="tx2"/>
-                </a:solidFill>
-                <a:latin typeface="+mn-lt"/>
-                <a:ea typeface="+mn-ea"/>
-                <a:cs typeface="+mn-cs"/>
-              </a:defRPr>
-            </a:lvl5pPr>
-            <a:lvl6pPr marL="2286000" indent="0" algn="ctr" defTabSz="914400" rtl="0" eaLnBrk="1" latinLnBrk="0" hangingPunct="1">
-              <a:lnSpc>
-                <a:spcPct val="94000"/>
-              </a:lnSpc>
-              <a:spcBef>
-                <a:spcPts val="500"/>
-              </a:spcBef>
-              <a:spcAft>
-                <a:spcPts val="200"/>
-              </a:spcAft>
-              <a:buFont typeface="Franklin Gothic Book" panose="020B0503020102020204" pitchFamily="34" charset="0"/>
-              <a:buNone/>
-              <a:defRPr sz="1600" i="1" kern="1200" baseline="0">
-                <a:solidFill>
-                  <a:schemeClr val="tx2"/>
-                </a:solidFill>
-                <a:latin typeface="+mn-lt"/>
-                <a:ea typeface="+mn-ea"/>
-                <a:cs typeface="+mn-cs"/>
-              </a:defRPr>
-            </a:lvl6pPr>
-            <a:lvl7pPr marL="2743200" indent="0" algn="ctr" defTabSz="914400" rtl="0" eaLnBrk="1" latinLnBrk="0" hangingPunct="1">
-              <a:lnSpc>
-                <a:spcPct val="94000"/>
-              </a:lnSpc>
-              <a:spcBef>
-                <a:spcPts val="500"/>
-              </a:spcBef>
-              <a:spcAft>
-                <a:spcPts val="200"/>
-              </a:spcAft>
-              <a:buFont typeface="Franklin Gothic Book" panose="020B0503020102020204" pitchFamily="34" charset="0"/>
-              <a:buNone/>
-              <a:defRPr sz="1600" kern="1200" baseline="0">
-                <a:solidFill>
-                  <a:schemeClr val="tx2"/>
-                </a:solidFill>
-                <a:latin typeface="+mn-lt"/>
-                <a:ea typeface="+mn-ea"/>
-                <a:cs typeface="+mn-cs"/>
-              </a:defRPr>
-            </a:lvl7pPr>
-            <a:lvl8pPr marL="3200400" indent="0" algn="ctr" defTabSz="914400" rtl="0" eaLnBrk="1" latinLnBrk="0" hangingPunct="1">
-              <a:lnSpc>
-                <a:spcPct val="94000"/>
-              </a:lnSpc>
-              <a:spcBef>
-                <a:spcPts val="500"/>
-              </a:spcBef>
-              <a:spcAft>
-                <a:spcPts val="200"/>
-              </a:spcAft>
-              <a:buFont typeface="Franklin Gothic Book" panose="020B0503020102020204" pitchFamily="34" charset="0"/>
-              <a:buNone/>
-              <a:defRPr sz="1600" i="1" kern="1200" baseline="0">
-                <a:solidFill>
-                  <a:schemeClr val="tx2"/>
-                </a:solidFill>
-                <a:latin typeface="+mn-lt"/>
-                <a:ea typeface="+mn-ea"/>
-                <a:cs typeface="+mn-cs"/>
-              </a:defRPr>
-            </a:lvl8pPr>
-            <a:lvl9pPr marL="3657600" indent="0" algn="ctr" defTabSz="914400" rtl="0" eaLnBrk="1" latinLnBrk="0" hangingPunct="1">
-              <a:lnSpc>
-                <a:spcPct val="94000"/>
-              </a:lnSpc>
-              <a:spcBef>
-                <a:spcPts val="500"/>
-              </a:spcBef>
-              <a:spcAft>
-                <a:spcPts val="200"/>
-              </a:spcAft>
-              <a:buFont typeface="Franklin Gothic Book" panose="020B0503020102020204" pitchFamily="34" charset="0"/>
-              <a:buNone/>
-              <a:defRPr sz="1600" kern="1200" baseline="0">
-                <a:solidFill>
-                  <a:schemeClr val="tx2"/>
-                </a:solidFill>
-                <a:latin typeface="+mn-lt"/>
-                <a:ea typeface="+mn-ea"/>
-                <a:cs typeface="+mn-cs"/>
-              </a:defRPr>
-            </a:lvl9pPr>
-          </a:lstStyle>
-          <a:p>
-            <a:r>
-              <a:rPr lang="en-US" sz="1800" dirty="0" smtClean="0"/>
-              <a:t>September 8, 2017</a:t>
-            </a:r>
-            <a:endParaRPr lang="en-US" sz="1800" dirty="0"/>
-          </a:p>
-        </p:txBody>
-      </p:sp>
     </p:spTree>
     <p:extLst>
       <p:ext uri="{BB962C8B-B14F-4D97-AF65-F5344CB8AC3E}">
@@ -4220,7 +3998,7 @@
           <a:p>
             <a:r>
               <a:rPr lang="en-US" dirty="0" smtClean="0"/>
-              <a:t>Marketing Plan</a:t>
+              <a:t>Cost</a:t>
             </a:r>
             <a:endParaRPr lang="en-US" dirty="0"/>
           </a:p>
@@ -4238,51 +4016,75 @@
         </p:nvSpPr>
         <p:spPr/>
         <p:txBody>
-          <a:bodyPr numCol="2">
+          <a:bodyPr>
             <a:normAutofit/>
           </a:bodyPr>
           <a:lstStyle/>
           <a:p>
             <a:r>
-              <a:rPr lang="en-US" dirty="0" smtClean="0"/>
-              <a:t>Word-of-Mouth marketing</a:t>
-            </a:r>
-          </a:p>
-          <a:p>
-            <a:endParaRPr lang="en-US" dirty="0" smtClean="0"/>
-          </a:p>
-          <a:p>
-            <a:r>
-              <a:rPr lang="en-US" dirty="0" smtClean="0"/>
-              <a:t>Social media</a:t>
-            </a:r>
-          </a:p>
-          <a:p>
-            <a:endParaRPr lang="en-US" dirty="0" smtClean="0"/>
-          </a:p>
-          <a:p>
-            <a:r>
-              <a:rPr lang="en-US" dirty="0" smtClean="0"/>
-              <a:t>SEO</a:t>
-            </a:r>
-          </a:p>
-          <a:p>
-            <a:endParaRPr lang="en-US" dirty="0" smtClean="0"/>
-          </a:p>
-          <a:p>
-            <a:r>
-              <a:rPr lang="en-US" dirty="0" smtClean="0"/>
-              <a:t>Partnerships with educational organizations</a:t>
-            </a:r>
-          </a:p>
-          <a:p>
-            <a:r>
-              <a:rPr lang="en-US" dirty="0" smtClean="0"/>
-              <a:t>AdSense</a:t>
-            </a:r>
-          </a:p>
-          <a:p>
-            <a:endParaRPr lang="en-US" dirty="0"/>
+              <a:rPr lang="en-US" dirty="0" smtClean="0">
+                <a:solidFill>
+                  <a:schemeClr val="tx1"/>
+                </a:solidFill>
+              </a:rPr>
+              <a:t>Labor: 120 hours + 12 hours maintenance</a:t>
+            </a:r>
+          </a:p>
+          <a:p>
+            <a:endParaRPr lang="en-US" dirty="0" smtClean="0">
+              <a:solidFill>
+                <a:schemeClr val="tx1"/>
+              </a:solidFill>
+            </a:endParaRPr>
+          </a:p>
+          <a:p>
+            <a:r>
+              <a:rPr lang="en-US" dirty="0">
+                <a:solidFill>
+                  <a:schemeClr val="tx1"/>
+                </a:solidFill>
+              </a:rPr>
+              <a:t>Domain (Google): $12/year </a:t>
+            </a:r>
+            <a:endParaRPr lang="en-US" dirty="0" smtClean="0">
+              <a:solidFill>
+                <a:schemeClr val="tx1"/>
+              </a:solidFill>
+            </a:endParaRPr>
+          </a:p>
+          <a:p>
+            <a:endParaRPr lang="en-US" dirty="0" smtClean="0">
+              <a:solidFill>
+                <a:schemeClr val="tx1"/>
+              </a:solidFill>
+            </a:endParaRPr>
+          </a:p>
+          <a:p>
+            <a:r>
+              <a:rPr lang="en-US" dirty="0" smtClean="0">
+                <a:solidFill>
+                  <a:schemeClr val="tx1"/>
+                </a:solidFill>
+              </a:rPr>
+              <a:t>Cost of prototype/single deck: $0</a:t>
+            </a:r>
+          </a:p>
+          <a:p>
+            <a:endParaRPr lang="en-US" dirty="0" smtClean="0">
+              <a:solidFill>
+                <a:schemeClr val="tx1"/>
+              </a:solidFill>
+            </a:endParaRPr>
+          </a:p>
+          <a:p>
+            <a:r>
+              <a:rPr lang="en-US" dirty="0" smtClean="0">
+                <a:solidFill>
+                  <a:schemeClr val="tx1"/>
+                </a:solidFill>
+              </a:rPr>
+              <a:t>Free Firebase: 8k visitors and 2.5 million card downloads each month</a:t>
+            </a:r>
           </a:p>
         </p:txBody>
       </p:sp>
@@ -4319,7 +4121,7 @@
     </p:spTree>
     <p:extLst>
       <p:ext uri="{BB962C8B-B14F-4D97-AF65-F5344CB8AC3E}">
-        <p14:creationId xmlns:p14="http://schemas.microsoft.com/office/powerpoint/2010/main" val="1040487182"/>
+        <p14:creationId xmlns:p14="http://schemas.microsoft.com/office/powerpoint/2010/main" val="1992923292"/>
       </p:ext>
     </p:extLst>
   </p:cSld>
@@ -4373,183 +4175,6 @@
           <a:p>
             <a:r>
               <a:rPr lang="en-US" dirty="0" smtClean="0"/>
-              <a:t>Cost</a:t>
-            </a:r>
-            <a:endParaRPr lang="en-US" dirty="0"/>
-          </a:p>
-        </p:txBody>
-      </p:sp>
-      <p:sp>
-        <p:nvSpPr>
-          <p:cNvPr id="3" name="Content Placeholder 2"/>
-          <p:cNvSpPr>
-            <a:spLocks noGrp="1"/>
-          </p:cNvSpPr>
-          <p:nvPr>
-            <p:ph idx="1"/>
-          </p:nvPr>
-        </p:nvSpPr>
-        <p:spPr/>
-        <p:txBody>
-          <a:bodyPr>
-            <a:normAutofit/>
-          </a:bodyPr>
-          <a:lstStyle/>
-          <a:p>
-            <a:r>
-              <a:rPr lang="en-US" dirty="0" smtClean="0">
-                <a:solidFill>
-                  <a:schemeClr val="tx1"/>
-                </a:solidFill>
-              </a:rPr>
-              <a:t>Labor: 120 hours + 12 hours maintenance</a:t>
-            </a:r>
-          </a:p>
-          <a:p>
-            <a:endParaRPr lang="en-US" dirty="0" smtClean="0">
-              <a:solidFill>
-                <a:schemeClr val="tx1"/>
-              </a:solidFill>
-            </a:endParaRPr>
-          </a:p>
-          <a:p>
-            <a:r>
-              <a:rPr lang="en-US" dirty="0">
-                <a:solidFill>
-                  <a:schemeClr val="tx1"/>
-                </a:solidFill>
-              </a:rPr>
-              <a:t>Domain (Google): $12/year </a:t>
-            </a:r>
-            <a:endParaRPr lang="en-US" dirty="0" smtClean="0">
-              <a:solidFill>
-                <a:schemeClr val="tx1"/>
-              </a:solidFill>
-            </a:endParaRPr>
-          </a:p>
-          <a:p>
-            <a:endParaRPr lang="en-US" dirty="0" smtClean="0">
-              <a:solidFill>
-                <a:schemeClr val="tx1"/>
-              </a:solidFill>
-            </a:endParaRPr>
-          </a:p>
-          <a:p>
-            <a:r>
-              <a:rPr lang="en-US" dirty="0" smtClean="0">
-                <a:solidFill>
-                  <a:schemeClr val="tx1"/>
-                </a:solidFill>
-              </a:rPr>
-              <a:t>Cost of prototype/single deck: $0</a:t>
-            </a:r>
-          </a:p>
-          <a:p>
-            <a:endParaRPr lang="en-US" dirty="0" smtClean="0">
-              <a:solidFill>
-                <a:schemeClr val="tx1"/>
-              </a:solidFill>
-            </a:endParaRPr>
-          </a:p>
-          <a:p>
-            <a:r>
-              <a:rPr lang="en-US" dirty="0" smtClean="0">
-                <a:solidFill>
-                  <a:schemeClr val="tx1"/>
-                </a:solidFill>
-              </a:rPr>
-              <a:t>Free Firebase: 8k visitors and 2.5 million card downloads each month</a:t>
-            </a:r>
-          </a:p>
-        </p:txBody>
-      </p:sp>
-      <p:pic>
-        <p:nvPicPr>
-          <p:cNvPr id="4" name="Picture 3"/>
-          <p:cNvPicPr>
-            <a:picLocks noChangeAspect="1"/>
-          </p:cNvPicPr>
-          <p:nvPr/>
-        </p:nvPicPr>
-        <p:blipFill>
-          <a:blip r:embed="rId2">
-            <a:extLst>
-              <a:ext uri="{28A0092B-C50C-407E-A947-70E740481C1C}">
-                <a14:useLocalDpi xmlns:a14="http://schemas.microsoft.com/office/drawing/2010/main" val="0"/>
-              </a:ext>
-            </a:extLst>
-          </a:blip>
-          <a:stretch>
-            <a:fillRect/>
-          </a:stretch>
-        </p:blipFill>
-        <p:spPr>
-          <a:xfrm>
-            <a:off x="10799783" y="312003"/>
-            <a:ext cx="1146794" cy="1116747"/>
-          </a:xfrm>
-          <a:prstGeom prst="rect">
-            <a:avLst/>
-          </a:prstGeom>
-        </p:spPr>
-      </p:pic>
-    </p:spTree>
-    <p:extLst>
-      <p:ext uri="{BB962C8B-B14F-4D97-AF65-F5344CB8AC3E}">
-        <p14:creationId xmlns:p14="http://schemas.microsoft.com/office/powerpoint/2010/main" val="1992923292"/>
-      </p:ext>
-    </p:extLst>
-  </p:cSld>
-  <p:clrMapOvr>
-    <a:masterClrMapping/>
-  </p:clrMapOvr>
-  <p:transition>
-    <p:fade/>
-  </p:transition>
-  <p:timing>
-    <p:tnLst>
-      <p:par>
-        <p:cTn id="1" dur="indefinite" restart="never" nodeType="tmRoot"/>
-      </p:par>
-    </p:tnLst>
-  </p:timing>
-</p:sld>
-</file>
-
-<file path=ppt/slides/slide12.xml><?xml version="1.0" encoding="utf-8"?>
-<p:sld xmlns:a="http://schemas.openxmlformats.org/drawingml/2006/main" xmlns:r="http://schemas.openxmlformats.org/officeDocument/2006/relationships" xmlns:p="http://schemas.openxmlformats.org/presentationml/2006/main">
-  <p:cSld>
-    <p:spTree>
-      <p:nvGrpSpPr>
-        <p:cNvPr id="1" name=""/>
-        <p:cNvGrpSpPr/>
-        <p:nvPr/>
-      </p:nvGrpSpPr>
-      <p:grpSpPr>
-        <a:xfrm>
-          <a:off x="0" y="0"/>
-          <a:ext cx="0" cy="0"/>
-          <a:chOff x="0" y="0"/>
-          <a:chExt cx="0" cy="0"/>
-        </a:xfrm>
-      </p:grpSpPr>
-      <p:sp>
-        <p:nvSpPr>
-          <p:cNvPr id="2" name="Title 1"/>
-          <p:cNvSpPr>
-            <a:spLocks noGrp="1"/>
-          </p:cNvSpPr>
-          <p:nvPr>
-            <p:ph type="title"/>
-          </p:nvPr>
-        </p:nvSpPr>
-        <p:spPr/>
-        <p:txBody>
-          <a:bodyPr/>
-          <a:lstStyle/>
-          <a:p>
-            <a:r>
-              <a:rPr lang="en-US" dirty="0" smtClean="0"/>
               <a:t>Group Milestones</a:t>
             </a:r>
             <a:endParaRPr lang="en-US" dirty="0"/>
@@ -4661,108 +4286,6 @@
 <file path=ppt/slides/slide2.xml><?xml version="1.0" encoding="utf-8"?>
 <p:sld xmlns:a="http://schemas.openxmlformats.org/drawingml/2006/main" xmlns:r="http://schemas.openxmlformats.org/officeDocument/2006/relationships" xmlns:p="http://schemas.openxmlformats.org/presentationml/2006/main">
   <p:cSld>
-    <p:spTree>
-      <p:nvGrpSpPr>
-        <p:cNvPr id="1" name=""/>
-        <p:cNvGrpSpPr/>
-        <p:nvPr/>
-      </p:nvGrpSpPr>
-      <p:grpSpPr>
-        <a:xfrm>
-          <a:off x="0" y="0"/>
-          <a:ext cx="0" cy="0"/>
-          <a:chOff x="0" y="0"/>
-          <a:chExt cx="0" cy="0"/>
-        </a:xfrm>
-      </p:grpSpPr>
-      <p:sp>
-        <p:nvSpPr>
-          <p:cNvPr id="2" name="Title 1"/>
-          <p:cNvSpPr>
-            <a:spLocks noGrp="1"/>
-          </p:cNvSpPr>
-          <p:nvPr>
-            <p:ph type="title"/>
-          </p:nvPr>
-        </p:nvSpPr>
-        <p:spPr/>
-        <p:txBody>
-          <a:bodyPr/>
-          <a:lstStyle/>
-          <a:p>
-            <a:r>
-              <a:rPr lang="en-US" dirty="0" smtClean="0"/>
-              <a:t>Developers</a:t>
-            </a:r>
-            <a:endParaRPr lang="en-US" dirty="0"/>
-          </a:p>
-        </p:txBody>
-      </p:sp>
-      <p:sp>
-        <p:nvSpPr>
-          <p:cNvPr id="3" name="Content Placeholder 2"/>
-          <p:cNvSpPr>
-            <a:spLocks noGrp="1"/>
-          </p:cNvSpPr>
-          <p:nvPr>
-            <p:ph idx="1"/>
-          </p:nvPr>
-        </p:nvSpPr>
-        <p:spPr/>
-        <p:txBody>
-          <a:bodyPr/>
-          <a:lstStyle/>
-          <a:p>
-            <a:r>
-              <a:rPr lang="en-US" dirty="0" smtClean="0"/>
-              <a:t>Julie Ching</a:t>
-            </a:r>
-          </a:p>
-          <a:p>
-            <a:r>
-              <a:rPr lang="en-US" dirty="0" smtClean="0"/>
-              <a:t>John </a:t>
-            </a:r>
-            <a:r>
-              <a:rPr lang="en-US" dirty="0" err="1" smtClean="0"/>
-              <a:t>Desrosiers</a:t>
-            </a:r>
-            <a:endParaRPr lang="en-US" dirty="0" smtClean="0"/>
-          </a:p>
-          <a:p>
-            <a:r>
-              <a:rPr lang="en-US" dirty="0" smtClean="0"/>
-              <a:t>Teddy Hidalgo</a:t>
-            </a:r>
-          </a:p>
-          <a:p>
-            <a:r>
-              <a:rPr lang="en-US" dirty="0" smtClean="0"/>
-              <a:t>Philip Ma</a:t>
-            </a:r>
-            <a:endParaRPr lang="en-US" dirty="0"/>
-          </a:p>
-        </p:txBody>
-      </p:sp>
-    </p:spTree>
-    <p:extLst>
-      <p:ext uri="{BB962C8B-B14F-4D97-AF65-F5344CB8AC3E}">
-        <p14:creationId xmlns:p14="http://schemas.microsoft.com/office/powerpoint/2010/main" val="395998055"/>
-      </p:ext>
-    </p:extLst>
-  </p:cSld>
-  <p:clrMapOvr>
-    <a:masterClrMapping/>
-  </p:clrMapOvr>
-  <p:transition>
-    <p:fade/>
-  </p:transition>
-</p:sld>
-</file>
-
-<file path=ppt/slides/slide3.xml><?xml version="1.0" encoding="utf-8"?>
-<p:sld xmlns:a="http://schemas.openxmlformats.org/drawingml/2006/main" xmlns:r="http://schemas.openxmlformats.org/officeDocument/2006/relationships" xmlns:p="http://schemas.openxmlformats.org/presentationml/2006/main">
-  <p:cSld>
     <p:bg>
       <p:bgPr>
         <a:solidFill>
@@ -4920,6 +4443,152 @@
     <p:extLst>
       <p:ext uri="{BB962C8B-B14F-4D97-AF65-F5344CB8AC3E}">
         <p14:creationId xmlns:p14="http://schemas.microsoft.com/office/powerpoint/2010/main" val="2016633862"/>
+      </p:ext>
+    </p:extLst>
+  </p:cSld>
+  <p:clrMapOvr>
+    <a:masterClrMapping/>
+  </p:clrMapOvr>
+  <p:transition>
+    <p:fade/>
+  </p:transition>
+  <p:timing>
+    <p:tnLst>
+      <p:par>
+        <p:cTn id="1" dur="indefinite" restart="never" nodeType="tmRoot"/>
+      </p:par>
+    </p:tnLst>
+  </p:timing>
+</p:sld>
+</file>
+
+<file path=ppt/slides/slide3.xml><?xml version="1.0" encoding="utf-8"?>
+<p:sld xmlns:a="http://schemas.openxmlformats.org/drawingml/2006/main" xmlns:r="http://schemas.openxmlformats.org/officeDocument/2006/relationships" xmlns:p="http://schemas.openxmlformats.org/presentationml/2006/main">
+  <p:cSld>
+    <p:spTree>
+      <p:nvGrpSpPr>
+        <p:cNvPr id="1" name=""/>
+        <p:cNvGrpSpPr/>
+        <p:nvPr/>
+      </p:nvGrpSpPr>
+      <p:grpSpPr>
+        <a:xfrm>
+          <a:off x="0" y="0"/>
+          <a:ext cx="0" cy="0"/>
+          <a:chOff x="0" y="0"/>
+          <a:chExt cx="0" cy="0"/>
+        </a:xfrm>
+      </p:grpSpPr>
+      <p:sp>
+        <p:nvSpPr>
+          <p:cNvPr id="2" name="Title 1"/>
+          <p:cNvSpPr>
+            <a:spLocks noGrp="1"/>
+          </p:cNvSpPr>
+          <p:nvPr>
+            <p:ph type="title"/>
+          </p:nvPr>
+        </p:nvSpPr>
+        <p:spPr/>
+        <p:txBody>
+          <a:bodyPr/>
+          <a:lstStyle/>
+          <a:p>
+            <a:r>
+              <a:rPr lang="en-US" dirty="0" smtClean="0"/>
+              <a:t>Application’s Concept</a:t>
+            </a:r>
+            <a:endParaRPr lang="en-US" dirty="0"/>
+          </a:p>
+        </p:txBody>
+      </p:sp>
+      <p:sp>
+        <p:nvSpPr>
+          <p:cNvPr id="3" name="Content Placeholder 2"/>
+          <p:cNvSpPr>
+            <a:spLocks noGrp="1"/>
+          </p:cNvSpPr>
+          <p:nvPr>
+            <p:ph idx="1"/>
+          </p:nvPr>
+        </p:nvSpPr>
+        <p:spPr/>
+        <p:txBody>
+          <a:bodyPr/>
+          <a:lstStyle/>
+          <a:p>
+            <a:r>
+              <a:rPr lang="en-US" dirty="0" smtClean="0"/>
+              <a:t>Flash Cards in your browser or on your smart phone</a:t>
+            </a:r>
+          </a:p>
+          <a:p>
+            <a:endParaRPr lang="en-US" dirty="0" smtClean="0"/>
+          </a:p>
+          <a:p>
+            <a:r>
+              <a:rPr lang="en-US" dirty="0" smtClean="0"/>
+              <a:t>Simple learning aid</a:t>
+            </a:r>
+          </a:p>
+          <a:p>
+            <a:endParaRPr lang="en-US" dirty="0"/>
+          </a:p>
+          <a:p>
+            <a:r>
+              <a:rPr lang="en-US" dirty="0" smtClean="0"/>
+              <a:t>Spark curiosity and go deeper with Wikipedia</a:t>
+            </a:r>
+          </a:p>
+          <a:p>
+            <a:endParaRPr lang="en-US" dirty="0" smtClean="0"/>
+          </a:p>
+          <a:p>
+            <a:r>
+              <a:rPr lang="en-US" dirty="0" smtClean="0"/>
+              <a:t>Make it fun and celebrate milestones</a:t>
+            </a:r>
+            <a:endParaRPr lang="en-US" dirty="0"/>
+          </a:p>
+          <a:p>
+            <a:endParaRPr lang="en-US" dirty="0"/>
+          </a:p>
+        </p:txBody>
+      </p:sp>
+      <p:pic>
+        <p:nvPicPr>
+          <p:cNvPr id="4" name="Picture 3"/>
+          <p:cNvPicPr>
+            <a:picLocks noChangeAspect="1"/>
+          </p:cNvPicPr>
+          <p:nvPr/>
+        </p:nvPicPr>
+        <p:blipFill>
+          <a:blip r:embed="rId2">
+            <a:extLst>
+              <a:ext uri="{28A0092B-C50C-407E-A947-70E740481C1C}">
+                <a14:useLocalDpi xmlns:a14="http://schemas.microsoft.com/office/drawing/2010/main" val="0"/>
+              </a:ext>
+            </a:extLst>
+          </a:blip>
+          <a:stretch>
+            <a:fillRect/>
+          </a:stretch>
+        </p:blipFill>
+        <p:spPr>
+          <a:xfrm>
+            <a:off x="10799783" y="312003"/>
+            <a:ext cx="1146794" cy="1116747"/>
+          </a:xfrm>
+          <a:prstGeom prst="rect">
+            <a:avLst/>
+          </a:prstGeom>
+        </p:spPr>
+      </p:pic>
+    </p:spTree>
+    <p:extLst>
+      <p:ext uri="{BB962C8B-B14F-4D97-AF65-F5344CB8AC3E}">
+        <p14:creationId xmlns:p14="http://schemas.microsoft.com/office/powerpoint/2010/main" val="1594798827"/>
       </p:ext>
     </p:extLst>
   </p:cSld>
@@ -4973,7 +4642,15 @@
           <a:p>
             <a:r>
               <a:rPr lang="en-US" dirty="0" smtClean="0"/>
-              <a:t>Application’s Concept</a:t>
+              <a:t>Motivation </a:t>
+            </a:r>
+            <a:r>
+              <a:rPr lang="en-US" dirty="0"/>
+              <a:t>for its </a:t>
+            </a:r>
+            <a:r>
+              <a:rPr lang="en-US" dirty="0" smtClean="0"/>
+              <a:t>Development</a:t>
             </a:r>
             <a:endParaRPr lang="en-US" dirty="0"/>
           </a:p>
@@ -4996,7 +4673,7 @@
           <a:p>
             <a:r>
               <a:rPr lang="en-US" dirty="0" smtClean="0"/>
-              <a:t>Flash Cards in your browser or on your smart phone</a:t>
+              <a:t>Self motivation</a:t>
             </a:r>
           </a:p>
           <a:p>
@@ -5005,29 +4682,17 @@
           <a:p>
             <a:r>
               <a:rPr lang="en-US" dirty="0" smtClean="0"/>
-              <a:t>Simple learning aid</a:t>
-            </a:r>
-          </a:p>
-          <a:p>
-            <a:endParaRPr lang="en-US" dirty="0"/>
+              <a:t>Additional topics</a:t>
+            </a:r>
+          </a:p>
+          <a:p>
+            <a:endParaRPr lang="en-US" dirty="0" smtClean="0"/>
           </a:p>
           <a:p>
             <a:r>
               <a:rPr lang="en-US" dirty="0" smtClean="0"/>
-              <a:t>Spark curiosity and go deeper with Wikipedia</a:t>
-            </a:r>
-          </a:p>
-          <a:p>
-            <a:endParaRPr lang="en-US" dirty="0" smtClean="0"/>
-          </a:p>
-          <a:p>
-            <a:r>
-              <a:rPr lang="en-US" dirty="0" smtClean="0"/>
-              <a:t>Make it fun and celebrate milestones</a:t>
-            </a:r>
-            <a:endParaRPr lang="en-US" dirty="0"/>
-          </a:p>
-          <a:p>
+              <a:t>Availability: open source</a:t>
+            </a:r>
             <a:endParaRPr lang="en-US" dirty="0"/>
           </a:p>
         </p:txBody>
@@ -5065,7 +4730,7 @@
     </p:spTree>
     <p:extLst>
       <p:ext uri="{BB962C8B-B14F-4D97-AF65-F5344CB8AC3E}">
-        <p14:creationId xmlns:p14="http://schemas.microsoft.com/office/powerpoint/2010/main" val="1594798827"/>
+        <p14:creationId xmlns:p14="http://schemas.microsoft.com/office/powerpoint/2010/main" val="587479645"/>
       </p:ext>
     </p:extLst>
   </p:cSld>
@@ -5112,71 +4777,89 @@
             <p:ph type="title"/>
           </p:nvPr>
         </p:nvSpPr>
-        <p:spPr/>
+        <p:spPr>
+          <a:xfrm>
+            <a:off x="1371600" y="685800"/>
+            <a:ext cx="9601200" cy="880975"/>
+          </a:xfrm>
+        </p:spPr>
         <p:txBody>
           <a:bodyPr/>
           <a:lstStyle/>
           <a:p>
             <a:r>
               <a:rPr lang="en-US" dirty="0" smtClean="0"/>
-              <a:t>Motivation </a:t>
-            </a:r>
-            <a:r>
-              <a:rPr lang="en-US" dirty="0"/>
-              <a:t>for its </a:t>
-            </a:r>
+              <a:t>Design Process</a:t>
+            </a:r>
+            <a:endParaRPr lang="en-US" dirty="0"/>
+          </a:p>
+        </p:txBody>
+      </p:sp>
+      <p:sp>
+        <p:nvSpPr>
+          <p:cNvPr id="3" name="Content Placeholder 2"/>
+          <p:cNvSpPr>
+            <a:spLocks noGrp="1"/>
+          </p:cNvSpPr>
+          <p:nvPr>
+            <p:ph idx="1"/>
+          </p:nvPr>
+        </p:nvSpPr>
+        <p:spPr>
+          <a:xfrm>
+            <a:off x="1585244" y="2170632"/>
+            <a:ext cx="4976949" cy="3529524"/>
+          </a:xfrm>
+        </p:spPr>
+        <p:txBody>
+          <a:bodyPr>
+            <a:normAutofit/>
+          </a:bodyPr>
+          <a:lstStyle/>
+          <a:p>
+            <a:r>
+              <a:rPr lang="en-US" dirty="0" smtClean="0"/>
+              <a:t>Proposals</a:t>
+            </a:r>
+          </a:p>
+          <a:p>
+            <a:endParaRPr lang="en-US" dirty="0" smtClean="0"/>
+          </a:p>
+          <a:p>
             <a:r>
               <a:rPr lang="en-US" dirty="0" smtClean="0"/>
               <a:t>Development</a:t>
             </a:r>
-            <a:endParaRPr lang="en-US" dirty="0"/>
-          </a:p>
-        </p:txBody>
-      </p:sp>
-      <p:sp>
-        <p:nvSpPr>
-          <p:cNvPr id="3" name="Content Placeholder 2"/>
-          <p:cNvSpPr>
-            <a:spLocks noGrp="1"/>
-          </p:cNvSpPr>
-          <p:nvPr>
-            <p:ph idx="1"/>
-          </p:nvPr>
-        </p:nvSpPr>
-        <p:spPr/>
-        <p:txBody>
-          <a:bodyPr/>
-          <a:lstStyle/>
+          </a:p>
+          <a:p>
+            <a:endParaRPr lang="en-US" dirty="0"/>
+          </a:p>
           <a:p>
             <a:r>
               <a:rPr lang="en-US" dirty="0" smtClean="0"/>
-              <a:t>Self motivation</a:t>
-            </a:r>
+              <a:t>Deployment</a:t>
+            </a:r>
+          </a:p>
+          <a:p>
+            <a:endParaRPr lang="en-US" dirty="0"/>
+          </a:p>
+          <a:p>
+            <a:r>
+              <a:rPr lang="en-US" dirty="0" smtClean="0"/>
+              <a:t>Release</a:t>
+            </a:r>
+          </a:p>
+          <a:p>
+            <a:endParaRPr lang="en-US" dirty="0"/>
           </a:p>
           <a:p>
             <a:endParaRPr lang="en-US" dirty="0" smtClean="0"/>
-          </a:p>
-          <a:p>
-            <a:r>
-              <a:rPr lang="en-US" dirty="0" smtClean="0"/>
-              <a:t>Additional topics</a:t>
-            </a:r>
-          </a:p>
-          <a:p>
-            <a:endParaRPr lang="en-US" dirty="0" smtClean="0"/>
-          </a:p>
-          <a:p>
-            <a:r>
-              <a:rPr lang="en-US" dirty="0" smtClean="0"/>
-              <a:t>Availability: open source</a:t>
-            </a:r>
-            <a:endParaRPr lang="en-US" dirty="0"/>
           </a:p>
         </p:txBody>
       </p:sp>
       <p:pic>
         <p:nvPicPr>
-          <p:cNvPr id="4" name="Picture 3"/>
+          <p:cNvPr id="6" name="Picture 5"/>
           <p:cNvPicPr>
             <a:picLocks noChangeAspect="1"/>
           </p:cNvPicPr>
@@ -5207,7 +4890,7 @@
     </p:spTree>
     <p:extLst>
       <p:ext uri="{BB962C8B-B14F-4D97-AF65-F5344CB8AC3E}">
-        <p14:creationId xmlns:p14="http://schemas.microsoft.com/office/powerpoint/2010/main" val="587479645"/>
+        <p14:creationId xmlns:p14="http://schemas.microsoft.com/office/powerpoint/2010/main" val="1788068256"/>
       </p:ext>
     </p:extLst>
   </p:cSld>
@@ -5254,19 +4937,18 @@
             <p:ph type="title"/>
           </p:nvPr>
         </p:nvSpPr>
-        <p:spPr>
-          <a:xfrm>
-            <a:off x="1371600" y="685800"/>
-            <a:ext cx="9601200" cy="880975"/>
-          </a:xfrm>
-        </p:spPr>
+        <p:spPr/>
         <p:txBody>
           <a:bodyPr/>
           <a:lstStyle/>
           <a:p>
             <a:r>
+              <a:rPr lang="en-US" dirty="0"/>
+              <a:t>T</a:t>
+            </a:r>
+            <a:r>
               <a:rPr lang="en-US" dirty="0" smtClean="0"/>
-              <a:t>Design Process</a:t>
+              <a:t>echnologies Used</a:t>
             </a:r>
             <a:endParaRPr lang="en-US" dirty="0"/>
           </a:p>
@@ -5282,21 +4964,16 @@
             <p:ph idx="1"/>
           </p:nvPr>
         </p:nvSpPr>
-        <p:spPr>
-          <a:xfrm>
-            <a:off x="1585244" y="2170632"/>
-            <a:ext cx="4976949" cy="3529524"/>
-          </a:xfrm>
-        </p:spPr>
-        <p:txBody>
-          <a:bodyPr>
-            <a:normAutofit/>
+        <p:spPr/>
+        <p:txBody>
+          <a:bodyPr numCol="2">
+            <a:normAutofit fontScale="92500" lnSpcReduction="10000"/>
           </a:bodyPr>
           <a:lstStyle/>
           <a:p>
             <a:r>
               <a:rPr lang="en-US" dirty="0" smtClean="0"/>
-              <a:t>Proposals</a:t>
+              <a:t>Wikipedia API</a:t>
             </a:r>
           </a:p>
           <a:p>
@@ -5305,38 +4982,100 @@
           <a:p>
             <a:r>
               <a:rPr lang="en-US" dirty="0" smtClean="0"/>
-              <a:t>Development</a:t>
-            </a:r>
-          </a:p>
-          <a:p>
-            <a:endParaRPr lang="en-US" dirty="0"/>
+              <a:t>JQuery Flip Plugin </a:t>
+            </a:r>
+          </a:p>
+          <a:p>
+            <a:endParaRPr lang="en-US" dirty="0" smtClean="0"/>
           </a:p>
           <a:p>
             <a:r>
               <a:rPr lang="en-US" dirty="0" smtClean="0"/>
-              <a:t>Deployment</a:t>
-            </a:r>
-          </a:p>
-          <a:p>
-            <a:endParaRPr lang="en-US" dirty="0"/>
-          </a:p>
-          <a:p>
+              <a:t>Google Sign-In via Firebase </a:t>
+            </a:r>
+          </a:p>
+          <a:p>
+            <a:endParaRPr lang="en-US" dirty="0" smtClean="0"/>
+          </a:p>
+          <a:p>
+            <a:r>
+              <a:rPr lang="en-US" dirty="0" err="1" smtClean="0"/>
+              <a:t>Giphy</a:t>
+            </a:r>
             <a:r>
               <a:rPr lang="en-US" dirty="0" smtClean="0"/>
-              <a:t>Release</a:t>
-            </a:r>
-          </a:p>
-          <a:p>
-            <a:endParaRPr lang="en-US" dirty="0"/>
-          </a:p>
-          <a:p>
+              <a:t> </a:t>
+            </a:r>
+            <a:r>
+              <a:rPr lang="en-US" dirty="0" smtClean="0"/>
+              <a:t>API</a:t>
+            </a:r>
+          </a:p>
+          <a:p>
+            <a:endParaRPr lang="en-US" dirty="0"/>
+          </a:p>
+          <a:p>
+            <a:r>
+              <a:rPr lang="en-US" dirty="0" err="1" smtClean="0"/>
+              <a:t>Pnotify</a:t>
+            </a:r>
+            <a:endParaRPr lang="en-US" dirty="0" smtClean="0"/>
+          </a:p>
+          <a:p>
+            <a:endParaRPr lang="en-US" dirty="0" smtClean="0"/>
+          </a:p>
+          <a:p>
+            <a:r>
+              <a:rPr lang="en-US" dirty="0" err="1" smtClean="0"/>
+              <a:t>Draw.io</a:t>
+            </a:r>
+            <a:r>
+              <a:rPr lang="en-US" dirty="0" smtClean="0"/>
+              <a:t> </a:t>
+            </a:r>
+            <a:endParaRPr lang="en-US" dirty="0" smtClean="0"/>
+          </a:p>
+          <a:p>
+            <a:endParaRPr lang="en-US" dirty="0" smtClean="0"/>
+          </a:p>
+          <a:p>
+            <a:r>
+              <a:rPr lang="en-US" dirty="0" err="1" smtClean="0"/>
+              <a:t>Pixlr</a:t>
+            </a:r>
+            <a:r>
+              <a:rPr lang="en-US" dirty="0" smtClean="0"/>
+              <a:t> Editor</a:t>
+            </a:r>
+          </a:p>
+          <a:p>
+            <a:endParaRPr lang="en-US" dirty="0"/>
+          </a:p>
+          <a:p>
+            <a:r>
+              <a:rPr lang="en-US" dirty="0" smtClean="0"/>
+              <a:t>Trello</a:t>
+            </a:r>
+          </a:p>
+          <a:p>
+            <a:endParaRPr lang="en-US" dirty="0"/>
+          </a:p>
+          <a:p>
+            <a:r>
+              <a:rPr lang="en-US" dirty="0" err="1" smtClean="0"/>
+              <a:t>Github</a:t>
+            </a:r>
+            <a:r>
+              <a:rPr lang="en-US" dirty="0" smtClean="0"/>
+              <a:t> Issues</a:t>
+            </a:r>
             <a:endParaRPr lang="en-US" dirty="0" smtClean="0"/>
           </a:p>
         </p:txBody>
       </p:sp>
       <p:pic>
         <p:nvPicPr>
-          <p:cNvPr id="6" name="Picture 5"/>
+          <p:cNvPr id="4" name="Picture 3"/>
           <p:cNvPicPr>
             <a:picLocks noChangeAspect="1"/>
           </p:cNvPicPr>
@@ -5367,7 +5106,7 @@
     </p:spTree>
     <p:extLst>
       <p:ext uri="{BB962C8B-B14F-4D97-AF65-F5344CB8AC3E}">
-        <p14:creationId xmlns:p14="http://schemas.microsoft.com/office/powerpoint/2010/main" val="1788068256"/>
+        <p14:creationId xmlns:p14="http://schemas.microsoft.com/office/powerpoint/2010/main" val="177022474"/>
       </p:ext>
     </p:extLst>
   </p:cSld>
@@ -5420,12 +5159,8 @@
           <a:lstStyle/>
           <a:p>
             <a:r>
-              <a:rPr lang="en-US" dirty="0"/>
-              <a:t>T</a:t>
-            </a:r>
-            <a:r>
               <a:rPr lang="en-US" dirty="0" smtClean="0"/>
-              <a:t>echnologies Used</a:t>
+              <a:t>Demo</a:t>
             </a:r>
             <a:endParaRPr lang="en-US" dirty="0"/>
           </a:p>
@@ -5443,104 +5178,19 @@
         </p:nvSpPr>
         <p:spPr/>
         <p:txBody>
-          <a:bodyPr numCol="2">
-            <a:normAutofit fontScale="92500" lnSpcReduction="10000"/>
-          </a:bodyPr>
+          <a:bodyPr/>
           <a:lstStyle/>
           <a:p>
             <a:r>
-              <a:rPr lang="en-US" dirty="0" smtClean="0"/>
-              <a:t>Wikipedia API</a:t>
-            </a:r>
-          </a:p>
-          <a:p>
+              <a:rPr lang="en-US" dirty="0" smtClean="0">
+                <a:hlinkClick r:id="rId2"/>
+              </a:rPr>
+              <a:t>codeDeck</a:t>
+            </a:r>
             <a:endParaRPr lang="en-US" dirty="0" smtClean="0"/>
           </a:p>
           <a:p>
-            <a:r>
-              <a:rPr lang="en-US" dirty="0" smtClean="0"/>
-              <a:t>JQuery Flip Plugin </a:t>
-            </a:r>
-          </a:p>
-          <a:p>
-            <a:endParaRPr lang="en-US" dirty="0" smtClean="0"/>
-          </a:p>
-          <a:p>
-            <a:r>
-              <a:rPr lang="en-US" dirty="0" smtClean="0"/>
-              <a:t>Google Sign-In via Firebase </a:t>
-            </a:r>
-          </a:p>
-          <a:p>
-            <a:endParaRPr lang="en-US" dirty="0" smtClean="0"/>
-          </a:p>
-          <a:p>
-            <a:r>
-              <a:rPr lang="en-US" dirty="0" err="1" smtClean="0"/>
-              <a:t>Giphy</a:t>
-            </a:r>
-            <a:r>
-              <a:rPr lang="en-US" dirty="0" smtClean="0"/>
-              <a:t> API</a:t>
-            </a:r>
-          </a:p>
-          <a:p>
-            <a:endParaRPr lang="en-US" dirty="0"/>
-          </a:p>
-          <a:p>
-            <a:r>
-              <a:rPr lang="en-US" dirty="0" err="1" smtClean="0"/>
-              <a:t>Pnotify</a:t>
-            </a:r>
-            <a:endParaRPr lang="en-US" dirty="0" smtClean="0"/>
-          </a:p>
-          <a:p>
-            <a:endParaRPr lang="en-US" dirty="0" smtClean="0"/>
-          </a:p>
-          <a:p>
-            <a:r>
-              <a:rPr lang="en-US" dirty="0" err="1" smtClean="0"/>
-              <a:t>Draw.io</a:t>
-            </a:r>
-            <a:r>
-              <a:rPr lang="en-US" dirty="0" smtClean="0"/>
-              <a:t> </a:t>
-            </a:r>
-          </a:p>
-          <a:p>
-            <a:endParaRPr lang="en-US" dirty="0" smtClean="0"/>
-          </a:p>
-          <a:p>
-            <a:r>
-              <a:rPr lang="en-US" dirty="0" err="1" smtClean="0"/>
-              <a:t>Pixlr</a:t>
-            </a:r>
-            <a:r>
-              <a:rPr lang="en-US" dirty="0" smtClean="0"/>
-              <a:t> Editor</a:t>
-            </a:r>
-          </a:p>
-          <a:p>
-            <a:endParaRPr lang="en-US" dirty="0"/>
-          </a:p>
-          <a:p>
-            <a:r>
-              <a:rPr lang="en-US" dirty="0" smtClean="0"/>
-              <a:t>Trello</a:t>
-            </a:r>
-          </a:p>
-          <a:p>
-            <a:endParaRPr lang="en-US" dirty="0"/>
-          </a:p>
-          <a:p>
-            <a:r>
-              <a:rPr lang="en-US" dirty="0" err="1" smtClean="0"/>
-              <a:t>Github</a:t>
-            </a:r>
-            <a:r>
-              <a:rPr lang="en-US" dirty="0" smtClean="0"/>
-              <a:t> Issues</a:t>
-            </a:r>
+            <a:endParaRPr lang="en-US" dirty="0"/>
           </a:p>
         </p:txBody>
       </p:sp>
@@ -5553,7 +5203,7 @@
           <p:nvPr/>
         </p:nvPicPr>
         <p:blipFill>
-          <a:blip r:embed="rId2">
+          <a:blip r:embed="rId3">
             <a:extLst>
               <a:ext uri="{28A0092B-C50C-407E-A947-70E740481C1C}">
                 <a14:useLocalDpi xmlns:a14="http://schemas.microsoft.com/office/drawing/2010/main" val="0"/>
@@ -5577,7 +5227,7 @@
     </p:spTree>
     <p:extLst>
       <p:ext uri="{BB962C8B-B14F-4D97-AF65-F5344CB8AC3E}">
-        <p14:creationId xmlns:p14="http://schemas.microsoft.com/office/powerpoint/2010/main" val="177022474"/>
+        <p14:creationId xmlns:p14="http://schemas.microsoft.com/office/powerpoint/2010/main" val="1463705858"/>
       </p:ext>
     </p:extLst>
   </p:cSld>
@@ -5630,16 +5280,20 @@
           <a:lstStyle/>
           <a:p>
             <a:r>
+              <a:rPr lang="en-US" dirty="0"/>
+              <a:t>Directions for </a:t>
+            </a:r>
+            <a:r>
               <a:rPr lang="en-US" dirty="0" smtClean="0"/>
-              <a:t>Demo</a:t>
-            </a:r>
-            <a:endParaRPr lang="en-US" dirty="0"/>
-          </a:p>
-        </p:txBody>
-      </p:sp>
-      <p:sp>
-        <p:nvSpPr>
-          <p:cNvPr id="3" name="Content Placeholder 2"/>
+              <a:t>Future Development</a:t>
+            </a:r>
+            <a:endParaRPr lang="en-US" dirty="0"/>
+          </a:p>
+        </p:txBody>
+      </p:sp>
+      <p:sp>
+        <p:nvSpPr>
+          <p:cNvPr id="5" name="Content Placeholder 4"/>
           <p:cNvSpPr>
             <a:spLocks noGrp="1"/>
           </p:cNvSpPr>
@@ -5649,19 +5303,40 @@
         </p:nvSpPr>
         <p:spPr/>
         <p:txBody>
-          <a:bodyPr/>
+          <a:bodyPr numCol="2"/>
           <a:lstStyle/>
           <a:p>
             <a:r>
-              <a:rPr lang="en-US" dirty="0" smtClean="0">
-                <a:hlinkClick r:id="rId2"/>
-              </a:rPr>
-              <a:t>codeDeck</a:t>
-            </a:r>
+              <a:rPr lang="en-US" dirty="0" smtClean="0"/>
+              <a:t>Additional decks</a:t>
+            </a:r>
+          </a:p>
+          <a:p>
             <a:endParaRPr lang="en-US" dirty="0" smtClean="0"/>
           </a:p>
           <a:p>
-            <a:endParaRPr lang="en-US" dirty="0"/>
+            <a:r>
+              <a:rPr lang="en-US" dirty="0" smtClean="0"/>
+              <a:t>Quiz</a:t>
+            </a:r>
+          </a:p>
+          <a:p>
+            <a:endParaRPr lang="en-US" dirty="0" smtClean="0"/>
+          </a:p>
+          <a:p>
+            <a:r>
+              <a:rPr lang="en-US" dirty="0" smtClean="0"/>
+              <a:t>View deck in reverse</a:t>
+            </a:r>
+          </a:p>
+          <a:p>
+            <a:endParaRPr lang="en-US" dirty="0" smtClean="0"/>
+          </a:p>
+          <a:p>
+            <a:r>
+              <a:rPr lang="en-US" dirty="0" smtClean="0"/>
+              <a:t>Dismiss cards</a:t>
+            </a:r>
           </a:p>
         </p:txBody>
       </p:sp>
@@ -5674,7 +5349,7 @@
           <p:nvPr/>
         </p:nvPicPr>
         <p:blipFill>
-          <a:blip r:embed="rId3">
+          <a:blip r:embed="rId2">
             <a:extLst>
               <a:ext uri="{28A0092B-C50C-407E-A947-70E740481C1C}">
                 <a14:useLocalDpi xmlns:a14="http://schemas.microsoft.com/office/drawing/2010/main" val="0"/>
@@ -5698,7 +5373,7 @@
     </p:spTree>
     <p:extLst>
       <p:ext uri="{BB962C8B-B14F-4D97-AF65-F5344CB8AC3E}">
-        <p14:creationId xmlns:p14="http://schemas.microsoft.com/office/powerpoint/2010/main" val="1463705858"/>
+        <p14:creationId xmlns:p14="http://schemas.microsoft.com/office/powerpoint/2010/main" val="1079179021"/>
       </p:ext>
     </p:extLst>
   </p:cSld>
@@ -5751,20 +5426,16 @@
           <a:lstStyle/>
           <a:p>
             <a:r>
-              <a:rPr lang="en-US" dirty="0"/>
-              <a:t>Directions for </a:t>
-            </a:r>
-            <a:r>
               <a:rPr lang="en-US" dirty="0" smtClean="0"/>
-              <a:t>Future Development</a:t>
-            </a:r>
-            <a:endParaRPr lang="en-US" dirty="0"/>
-          </a:p>
-        </p:txBody>
-      </p:sp>
-      <p:sp>
-        <p:nvSpPr>
-          <p:cNvPr id="5" name="Content Placeholder 4"/>
+              <a:t>Marketing Plan</a:t>
+            </a:r>
+            <a:endParaRPr lang="en-US" dirty="0"/>
+          </a:p>
+        </p:txBody>
+      </p:sp>
+      <p:sp>
+        <p:nvSpPr>
+          <p:cNvPr id="3" name="Content Placeholder 2"/>
           <p:cNvSpPr>
             <a:spLocks noGrp="1"/>
           </p:cNvSpPr>
@@ -5774,12 +5445,14 @@
         </p:nvSpPr>
         <p:spPr/>
         <p:txBody>
-          <a:bodyPr numCol="2"/>
+          <a:bodyPr numCol="2">
+            <a:normAutofit/>
+          </a:bodyPr>
           <a:lstStyle/>
           <a:p>
             <a:r>
               <a:rPr lang="en-US" dirty="0" smtClean="0"/>
-              <a:t>Additional decks</a:t>
+              <a:t>Word-of-Mouth marketing</a:t>
             </a:r>
           </a:p>
           <a:p>
@@ -5788,7 +5461,7 @@
           <a:p>
             <a:r>
               <a:rPr lang="en-US" dirty="0" smtClean="0"/>
-              <a:t>Quiz</a:t>
+              <a:t>Social media</a:t>
             </a:r>
           </a:p>
           <a:p>
@@ -5797,7 +5470,7 @@
           <a:p>
             <a:r>
               <a:rPr lang="en-US" dirty="0" smtClean="0"/>
-              <a:t>View deck in reverse</a:t>
+              <a:t>SEO</a:t>
             </a:r>
           </a:p>
           <a:p>
@@ -5806,8 +5479,17 @@
           <a:p>
             <a:r>
               <a:rPr lang="en-US" dirty="0" smtClean="0"/>
-              <a:t>Dismiss cards</a:t>
-            </a:r>
+              <a:t>Partnerships with educational organizations</a:t>
+            </a:r>
+          </a:p>
+          <a:p>
+            <a:r>
+              <a:rPr lang="en-US" dirty="0" smtClean="0"/>
+              <a:t>AdSense</a:t>
+            </a:r>
+          </a:p>
+          <a:p>
+            <a:endParaRPr lang="en-US" dirty="0"/>
           </a:p>
         </p:txBody>
       </p:sp>
@@ -5844,7 +5526,7 @@
     </p:spTree>
     <p:extLst>
       <p:ext uri="{BB962C8B-B14F-4D97-AF65-F5344CB8AC3E}">
-        <p14:creationId xmlns:p14="http://schemas.microsoft.com/office/powerpoint/2010/main" val="1079179021"/>
+        <p14:creationId xmlns:p14="http://schemas.microsoft.com/office/powerpoint/2010/main" val="1040487182"/>
       </p:ext>
     </p:extLst>
   </p:cSld>

</xml_diff>